<commit_message>
Signed-off-by: Frank Fang <frankfang@189.cn>
</commit_message>
<xml_diff>
--- a/yourtour/documents/business/YourTour BP 2.0.pptx
+++ b/yourtour/documents/business/YourTour BP 2.0.pptx
@@ -13,22 +13,25 @@
     <p:sldId id="261" r:id="rId7"/>
     <p:sldId id="264" r:id="rId8"/>
     <p:sldId id="262" r:id="rId9"/>
-    <p:sldId id="263" r:id="rId10"/>
-    <p:sldId id="269" r:id="rId11"/>
-    <p:sldId id="270" r:id="rId12"/>
-    <p:sldId id="278" r:id="rId13"/>
-    <p:sldId id="271" r:id="rId14"/>
-    <p:sldId id="279" r:id="rId15"/>
-    <p:sldId id="268" r:id="rId16"/>
-    <p:sldId id="266" r:id="rId17"/>
-    <p:sldId id="265" r:id="rId18"/>
-    <p:sldId id="272" r:id="rId19"/>
-    <p:sldId id="275" r:id="rId20"/>
-    <p:sldId id="273" r:id="rId21"/>
-    <p:sldId id="274" r:id="rId22"/>
-    <p:sldId id="276" r:id="rId23"/>
-    <p:sldId id="280" r:id="rId24"/>
-    <p:sldId id="277" r:id="rId25"/>
+    <p:sldId id="281" r:id="rId10"/>
+    <p:sldId id="263" r:id="rId11"/>
+    <p:sldId id="269" r:id="rId12"/>
+    <p:sldId id="270" r:id="rId13"/>
+    <p:sldId id="278" r:id="rId14"/>
+    <p:sldId id="271" r:id="rId15"/>
+    <p:sldId id="279" r:id="rId16"/>
+    <p:sldId id="268" r:id="rId17"/>
+    <p:sldId id="266" r:id="rId18"/>
+    <p:sldId id="265" r:id="rId19"/>
+    <p:sldId id="272" r:id="rId20"/>
+    <p:sldId id="275" r:id="rId21"/>
+    <p:sldId id="273" r:id="rId22"/>
+    <p:sldId id="274" r:id="rId23"/>
+    <p:sldId id="276" r:id="rId24"/>
+    <p:sldId id="283" r:id="rId25"/>
+    <p:sldId id="280" r:id="rId26"/>
+    <p:sldId id="277" r:id="rId27"/>
+    <p:sldId id="282" r:id="rId28"/>
   </p:sldIdLst>
   <p:sldSz cx="9144000" cy="6858000" type="screen4x3"/>
   <p:notesSz cx="6858000" cy="9144000"/>
@@ -311,7 +314,7 @@
           <a:p>
             <a:fld id="{530820CF-B880-4189-942D-D702A7CBA730}" type="datetimeFigureOut">
               <a:rPr lang="zh-CN" altLang="en-US" smtClean="0"/>
-              <a:t>2016/2/28</a:t>
+              <a:t>2016/3/15</a:t>
             </a:fld>
             <a:endParaRPr lang="zh-CN" altLang="en-US"/>
           </a:p>
@@ -476,7 +479,7 @@
           <a:p>
             <a:fld id="{530820CF-B880-4189-942D-D702A7CBA730}" type="datetimeFigureOut">
               <a:rPr lang="zh-CN" altLang="en-US" smtClean="0"/>
-              <a:t>2016/2/28</a:t>
+              <a:t>2016/3/15</a:t>
             </a:fld>
             <a:endParaRPr lang="zh-CN" altLang="en-US"/>
           </a:p>
@@ -651,7 +654,7 @@
           <a:p>
             <a:fld id="{530820CF-B880-4189-942D-D702A7CBA730}" type="datetimeFigureOut">
               <a:rPr lang="zh-CN" altLang="en-US" smtClean="0"/>
-              <a:t>2016/2/28</a:t>
+              <a:t>2016/3/15</a:t>
             </a:fld>
             <a:endParaRPr lang="zh-CN" altLang="en-US"/>
           </a:p>
@@ -816,7 +819,7 @@
           <a:p>
             <a:fld id="{530820CF-B880-4189-942D-D702A7CBA730}" type="datetimeFigureOut">
               <a:rPr lang="zh-CN" altLang="en-US" smtClean="0"/>
-              <a:t>2016/2/28</a:t>
+              <a:t>2016/3/15</a:t>
             </a:fld>
             <a:endParaRPr lang="zh-CN" altLang="en-US"/>
           </a:p>
@@ -1057,7 +1060,7 @@
           <a:p>
             <a:fld id="{530820CF-B880-4189-942D-D702A7CBA730}" type="datetimeFigureOut">
               <a:rPr lang="zh-CN" altLang="en-US" smtClean="0"/>
-              <a:t>2016/2/28</a:t>
+              <a:t>2016/3/15</a:t>
             </a:fld>
             <a:endParaRPr lang="zh-CN" altLang="en-US"/>
           </a:p>
@@ -1340,7 +1343,7 @@
           <a:p>
             <a:fld id="{530820CF-B880-4189-942D-D702A7CBA730}" type="datetimeFigureOut">
               <a:rPr lang="zh-CN" altLang="en-US" smtClean="0"/>
-              <a:t>2016/2/28</a:t>
+              <a:t>2016/3/15</a:t>
             </a:fld>
             <a:endParaRPr lang="zh-CN" altLang="en-US"/>
           </a:p>
@@ -1757,7 +1760,7 @@
           <a:p>
             <a:fld id="{530820CF-B880-4189-942D-D702A7CBA730}" type="datetimeFigureOut">
               <a:rPr lang="zh-CN" altLang="en-US" smtClean="0"/>
-              <a:t>2016/2/28</a:t>
+              <a:t>2016/3/15</a:t>
             </a:fld>
             <a:endParaRPr lang="zh-CN" altLang="en-US"/>
           </a:p>
@@ -1870,7 +1873,7 @@
           <a:p>
             <a:fld id="{530820CF-B880-4189-942D-D702A7CBA730}" type="datetimeFigureOut">
               <a:rPr lang="zh-CN" altLang="en-US" smtClean="0"/>
-              <a:t>2016/2/28</a:t>
+              <a:t>2016/3/15</a:t>
             </a:fld>
             <a:endParaRPr lang="zh-CN" altLang="en-US"/>
           </a:p>
@@ -1960,7 +1963,7 @@
           <a:p>
             <a:fld id="{530820CF-B880-4189-942D-D702A7CBA730}" type="datetimeFigureOut">
               <a:rPr lang="zh-CN" altLang="en-US" smtClean="0"/>
-              <a:t>2016/2/28</a:t>
+              <a:t>2016/3/15</a:t>
             </a:fld>
             <a:endParaRPr lang="zh-CN" altLang="en-US"/>
           </a:p>
@@ -2232,7 +2235,7 @@
           <a:p>
             <a:fld id="{530820CF-B880-4189-942D-D702A7CBA730}" type="datetimeFigureOut">
               <a:rPr lang="zh-CN" altLang="en-US" smtClean="0"/>
-              <a:t>2016/2/28</a:t>
+              <a:t>2016/3/15</a:t>
             </a:fld>
             <a:endParaRPr lang="zh-CN" altLang="en-US"/>
           </a:p>
@@ -2480,7 +2483,7 @@
           <a:p>
             <a:fld id="{530820CF-B880-4189-942D-D702A7CBA730}" type="datetimeFigureOut">
               <a:rPr lang="zh-CN" altLang="en-US" smtClean="0"/>
-              <a:t>2016/2/28</a:t>
+              <a:t>2016/3/15</a:t>
             </a:fld>
             <a:endParaRPr lang="zh-CN" altLang="en-US"/>
           </a:p>
@@ -2688,7 +2691,7 @@
           <a:p>
             <a:fld id="{530820CF-B880-4189-942D-D702A7CBA730}" type="datetimeFigureOut">
               <a:rPr lang="zh-CN" altLang="en-US" smtClean="0"/>
-              <a:t>2016/2/28</a:t>
+              <a:t>2016/3/15</a:t>
             </a:fld>
             <a:endParaRPr lang="zh-CN" altLang="en-US"/>
           </a:p>
@@ -3114,6 +3117,13 @@
   <p:clrMapOvr>
     <a:masterClrMapping/>
   </p:clrMapOvr>
+  <p:timing>
+    <p:tnLst>
+      <p:par>
+        <p:cTn id="1" dur="indefinite" restart="never" nodeType="tmRoot"/>
+      </p:par>
+    </p:tnLst>
+  </p:timing>
 </p:sld>
 </file>
 
@@ -3151,7 +3161,7 @@
           <a:p>
             <a:r>
               <a:rPr lang="zh-CN" altLang="en-US" dirty="0" smtClean="0"/>
-              <a:t>市场的机会</a:t>
+              <a:t>自助游客的困惑</a:t>
             </a:r>
             <a:endParaRPr lang="zh-CN" altLang="en-US" dirty="0"/>
           </a:p>
@@ -3170,32 +3180,71 @@
         <p:spPr/>
         <p:txBody>
           <a:bodyPr>
-            <a:normAutofit fontScale="92500" lnSpcReduction="10000"/>
+            <a:normAutofit fontScale="92500" lnSpcReduction="20000"/>
           </a:bodyPr>
           <a:lstStyle/>
           <a:p>
             <a:r>
               <a:rPr lang="zh-CN" altLang="en-US" dirty="0" smtClean="0"/>
-              <a:t>单一的旅游元素已经都做到了极致，机票、酒店、饭店、机票的</a:t>
-            </a:r>
-            <a:r>
-              <a:rPr lang="en-US" altLang="zh-CN" dirty="0" smtClean="0"/>
-              <a:t>ARPU</a:t>
-            </a:r>
-            <a:r>
-              <a:rPr lang="zh-CN" altLang="en-US" dirty="0" smtClean="0"/>
-              <a:t>值逐渐走低</a:t>
+              <a:t>选择目的地困难，不知道到哪里去玩</a:t>
             </a:r>
             <a:endParaRPr lang="en-US" altLang="zh-CN" dirty="0" smtClean="0"/>
           </a:p>
           <a:p>
             <a:r>
               <a:rPr lang="zh-CN" altLang="en-US" dirty="0"/>
-              <a:t>自助</a:t>
-            </a:r>
-            <a:r>
-              <a:rPr lang="zh-CN" altLang="en-US" dirty="0" smtClean="0"/>
-              <a:t>游已经占据了旅游市场的大半壁江山，但是只是简单的看游记，大多数用户很难确定自己的行程；就算到了当地，网上看来的资料和现实还是有差距，还有许多天气</a:t>
+              <a:t>到</a:t>
+            </a:r>
+            <a:r>
+              <a:rPr lang="zh-CN" altLang="en-US" dirty="0" smtClean="0"/>
+              <a:t>了目的地，不知道到底什么才是好玩的</a:t>
+            </a:r>
+            <a:endParaRPr lang="en-US" altLang="zh-CN" dirty="0" smtClean="0"/>
+          </a:p>
+          <a:p>
+            <a:r>
+              <a:rPr lang="zh-CN" altLang="en-US" dirty="0" smtClean="0"/>
+              <a:t>到</a:t>
+            </a:r>
+            <a:r>
+              <a:rPr lang="zh-CN" altLang="en-US" dirty="0"/>
+              <a:t>了目的地，不停的看地图，找地方，询问和沟通花了太多的时间</a:t>
+            </a:r>
+            <a:endParaRPr lang="en-US" altLang="zh-CN" dirty="0"/>
+          </a:p>
+          <a:p>
+            <a:pPr lvl="2"/>
+            <a:r>
+              <a:rPr lang="zh-CN" altLang="en-US" dirty="0" smtClean="0"/>
+              <a:t>附近有什么好玩的</a:t>
+            </a:r>
+            <a:endParaRPr lang="en-US" altLang="zh-CN" dirty="0" smtClean="0"/>
+          </a:p>
+          <a:p>
+            <a:pPr lvl="2"/>
+            <a:r>
+              <a:rPr lang="zh-CN" altLang="en-US" dirty="0" smtClean="0"/>
+              <a:t>房间</a:t>
+            </a:r>
+            <a:r>
+              <a:rPr lang="zh-CN" altLang="en-US" dirty="0"/>
+              <a:t>和网上展示的也不太一样</a:t>
+            </a:r>
+            <a:endParaRPr lang="en-US" altLang="zh-CN" dirty="0"/>
+          </a:p>
+          <a:p>
+            <a:pPr lvl="2"/>
+            <a:r>
+              <a:rPr lang="zh-CN" altLang="en-US" dirty="0"/>
+              <a:t>每天不知道吃什么，头疼</a:t>
+            </a:r>
+            <a:endParaRPr lang="en-US" altLang="zh-CN" dirty="0"/>
+          </a:p>
+          <a:p>
+            <a:pPr lvl="2"/>
+            <a:r>
+              <a:rPr lang="zh-CN" altLang="en-US" dirty="0" smtClean="0"/>
+              <a:t>怎么从机场</a:t>
             </a:r>
             <a:r>
               <a:rPr lang="en-US" altLang="zh-CN" dirty="0" smtClean="0"/>
@@ -3203,19 +3252,25 @@
             </a:r>
             <a:r>
               <a:rPr lang="zh-CN" altLang="en-US" dirty="0" smtClean="0"/>
-              <a:t>交通等可变因素</a:t>
-            </a:r>
-            <a:endParaRPr lang="en-US" altLang="zh-CN" dirty="0" smtClean="0"/>
-          </a:p>
-          <a:p>
-            <a:r>
-              <a:rPr lang="zh-CN" altLang="en-US" dirty="0" smtClean="0"/>
-              <a:t>导游行业主要是垄断旅游资源，如景点、酒店为主，吃回扣，真正到导游手里的回扣很低，主要是被公司吃去；部分导游也有达人情怀</a:t>
-            </a:r>
-            <a:endParaRPr lang="en-US" altLang="zh-CN" dirty="0" smtClean="0"/>
-          </a:p>
-          <a:p>
-            <a:endParaRPr lang="en-US" altLang="zh-CN" dirty="0" smtClean="0"/>
+              <a:t>火车站到宾馆</a:t>
+            </a:r>
+            <a:endParaRPr lang="en-US" altLang="zh-CN" dirty="0" smtClean="0"/>
+          </a:p>
+          <a:p>
+            <a:pPr lvl="1"/>
+            <a:r>
+              <a:rPr lang="zh-CN" altLang="en-US" dirty="0" smtClean="0"/>
+              <a:t>能不能有人给我全程讲讲当地的文化、传说故事，什么东西好吃</a:t>
+            </a:r>
+            <a:endParaRPr lang="en-US" altLang="zh-CN" dirty="0" smtClean="0"/>
+          </a:p>
+          <a:p>
+            <a:pPr lvl="1"/>
+            <a:r>
+              <a:rPr lang="zh-CN" altLang="en-US" dirty="0" smtClean="0"/>
+              <a:t>交通是个大问题，坐公共交通有时间限制，不能尽情的玩，自己开车又太累，开了怕玩不动了</a:t>
+            </a:r>
+            <a:endParaRPr lang="zh-CN" altLang="en-US" dirty="0"/>
           </a:p>
           <a:p>
             <a:endParaRPr lang="zh-CN" altLang="en-US" dirty="0"/>
@@ -3225,7 +3280,7 @@
     </p:spTree>
     <p:extLst>
       <p:ext uri="{BB962C8B-B14F-4D97-AF65-F5344CB8AC3E}">
-        <p14:creationId xmlns:p14="http://schemas.microsoft.com/office/powerpoint/2010/main" val="792942642"/>
+        <p14:creationId xmlns:p14="http://schemas.microsoft.com/office/powerpoint/2010/main" val="422544032"/>
       </p:ext>
     </p:extLst>
   </p:cSld>
@@ -3268,62 +3323,52 @@
           <a:lstStyle/>
           <a:p>
             <a:r>
+              <a:rPr lang="zh-CN" altLang="en-US" dirty="0" smtClean="0"/>
+              <a:t>市场的机会</a:t>
+            </a:r>
+            <a:endParaRPr lang="zh-CN" altLang="en-US" dirty="0"/>
+          </a:p>
+        </p:txBody>
+      </p:sp>
+      <p:sp>
+        <p:nvSpPr>
+          <p:cNvPr id="3" name="内容占位符 2"/>
+          <p:cNvSpPr>
+            <a:spLocks noGrp="1"/>
+          </p:cNvSpPr>
+          <p:nvPr>
+            <p:ph idx="1"/>
+          </p:nvPr>
+        </p:nvSpPr>
+        <p:spPr/>
+        <p:txBody>
+          <a:bodyPr>
+            <a:normAutofit fontScale="85000" lnSpcReduction="10000"/>
+          </a:bodyPr>
+          <a:lstStyle/>
+          <a:p>
+            <a:r>
+              <a:rPr lang="zh-CN" altLang="en-US" dirty="0" smtClean="0"/>
+              <a:t>单一的旅游元素已经都做到了极致，机票、酒店、饭店、机票等碎片资源的</a:t>
+            </a:r>
+            <a:r>
               <a:rPr lang="en-US" altLang="zh-CN" dirty="0" smtClean="0"/>
-              <a:t>OTA</a:t>
-            </a:r>
-            <a:r>
-              <a:rPr lang="zh-CN" altLang="en-US" dirty="0" smtClean="0"/>
-              <a:t>市场的机会</a:t>
-            </a:r>
-            <a:endParaRPr lang="zh-CN" altLang="en-US" dirty="0"/>
-          </a:p>
-        </p:txBody>
-      </p:sp>
-      <p:sp>
-        <p:nvSpPr>
-          <p:cNvPr id="3" name="内容占位符 2"/>
-          <p:cNvSpPr>
-            <a:spLocks noGrp="1"/>
-          </p:cNvSpPr>
-          <p:nvPr>
-            <p:ph idx="1"/>
-          </p:nvPr>
-        </p:nvSpPr>
-        <p:spPr/>
-        <p:txBody>
-          <a:bodyPr>
-            <a:normAutofit fontScale="77500" lnSpcReduction="20000"/>
-          </a:bodyPr>
-          <a:lstStyle/>
-          <a:p>
-            <a:r>
-              <a:rPr lang="zh-CN" altLang="en-US" dirty="0" smtClean="0"/>
-              <a:t>整个旅游业市场的投资规模已经超过万亿（旅游协会）</a:t>
-            </a:r>
-            <a:endParaRPr lang="en-US" altLang="zh-CN" dirty="0" smtClean="0"/>
-          </a:p>
-          <a:p>
-            <a:r>
-              <a:rPr lang="en-US" altLang="zh-CN" dirty="0" smtClean="0"/>
-              <a:t>OTA</a:t>
-            </a:r>
-            <a:r>
-              <a:rPr lang="zh-CN" altLang="en-US" dirty="0" smtClean="0"/>
-              <a:t>市场在整个旅游市场的比重已经近</a:t>
-            </a:r>
-            <a:r>
-              <a:rPr lang="en-US" altLang="zh-CN" dirty="0" smtClean="0"/>
-              <a:t>10%</a:t>
-            </a:r>
-          </a:p>
-          <a:p>
-            <a:r>
-              <a:rPr lang="en-US" altLang="zh-CN" dirty="0" smtClean="0"/>
-              <a:t>2015</a:t>
-            </a:r>
-            <a:r>
-              <a:rPr lang="zh-CN" altLang="en-US" dirty="0" smtClean="0"/>
-              <a:t>年的大并购，逐渐形成了携程</a:t>
+              <a:t>ARPU</a:t>
+            </a:r>
+            <a:r>
+              <a:rPr lang="zh-CN" altLang="en-US" dirty="0" smtClean="0"/>
+              <a:t>值逐渐走低</a:t>
+            </a:r>
+            <a:endParaRPr lang="en-US" altLang="zh-CN" dirty="0" smtClean="0"/>
+          </a:p>
+          <a:p>
+            <a:r>
+              <a:rPr lang="zh-CN" altLang="en-US" dirty="0"/>
+              <a:t>自助</a:t>
+            </a:r>
+            <a:r>
+              <a:rPr lang="zh-CN" altLang="en-US" dirty="0" smtClean="0"/>
+              <a:t>游已经占据了旅游市场的大半壁江山，但是只是简单的看游记，大多数用户很难确定自己的行程；就算到了当地，网上看来的资料和现实还是有差距，还有许多天气</a:t>
             </a:r>
             <a:r>
               <a:rPr lang="en-US" altLang="zh-CN" dirty="0" smtClean="0"/>
@@ -3331,50 +3376,28 @@
             </a:r>
             <a:r>
               <a:rPr lang="zh-CN" altLang="en-US" dirty="0" smtClean="0"/>
-              <a:t>去哪儿独大的局面，其他的综合性</a:t>
-            </a:r>
-            <a:r>
-              <a:rPr lang="en-US" altLang="zh-CN" dirty="0" smtClean="0"/>
-              <a:t>OTA</a:t>
-            </a:r>
-            <a:r>
-              <a:rPr lang="zh-CN" altLang="en-US" dirty="0" smtClean="0"/>
-              <a:t>，例如阿里旅行主要在做并购和流水，</a:t>
-            </a:r>
-            <a:endParaRPr lang="en-US" altLang="zh-CN" dirty="0" smtClean="0"/>
-          </a:p>
-          <a:p>
-            <a:r>
-              <a:rPr lang="zh-CN" altLang="en-US" dirty="0" smtClean="0"/>
-              <a:t>他们希望通过将旅游资源扁平化来取代原来导游的功能。但是人文关怀往往是旅游过程中最为精彩的部分，俗话说：玩什么不重要，往往和谁玩才重要；讲述、沟通一站式的服务才是旅游的精髓</a:t>
-            </a:r>
-            <a:endParaRPr lang="en-US" altLang="zh-CN" dirty="0" smtClean="0"/>
-          </a:p>
-          <a:p>
-            <a:r>
-              <a:rPr lang="en-US" altLang="zh-CN" dirty="0"/>
-              <a:t>OTA</a:t>
-            </a:r>
-            <a:r>
-              <a:rPr lang="zh-CN" altLang="en-US" dirty="0" smtClean="0"/>
-              <a:t>旅游投诉逐年上升，主要是</a:t>
-            </a:r>
-            <a:r>
-              <a:rPr lang="en-US" altLang="zh-CN" dirty="0" smtClean="0"/>
-              <a:t>OTA</a:t>
-            </a:r>
-            <a:r>
-              <a:rPr lang="zh-CN" altLang="en-US" dirty="0" smtClean="0"/>
-              <a:t>和他们复杂的下线体系之间的许多信息不对称，以及追求利益最大化造成的，用户觉得在</a:t>
-            </a:r>
-            <a:r>
-              <a:rPr lang="en-US" altLang="zh-CN" dirty="0" smtClean="0"/>
-              <a:t>OTA</a:t>
-            </a:r>
-            <a:r>
-              <a:rPr lang="zh-CN" altLang="en-US" dirty="0" smtClean="0"/>
-              <a:t>上预订完后，就没有后续服务了</a:t>
-            </a:r>
+              <a:t>交通等可变因素</a:t>
+            </a:r>
+            <a:endParaRPr lang="en-US" altLang="zh-CN" dirty="0" smtClean="0"/>
+          </a:p>
+          <a:p>
+            <a:r>
+              <a:rPr lang="zh-CN" altLang="en-US" dirty="0" smtClean="0"/>
+              <a:t>导游行业主要是垄断旅游资源，如景点、酒店为主，吃回扣，真正到导游手里的回扣很低，主要是被公司吃去；部分导游也有达人情怀</a:t>
+            </a:r>
+            <a:endParaRPr lang="en-US" altLang="zh-CN" dirty="0" smtClean="0"/>
+          </a:p>
+          <a:p>
+            <a:r>
+              <a:rPr lang="zh-CN" altLang="en-US" dirty="0" smtClean="0"/>
+              <a:t>那些抵回扣，很好玩，用户体验好，有参与感的地方就是我们的机会</a:t>
+            </a:r>
+            <a:endParaRPr lang="en-US" altLang="zh-CN" dirty="0" smtClean="0"/>
+          </a:p>
+          <a:p>
+            <a:endParaRPr lang="en-US" altLang="zh-CN" dirty="0" smtClean="0"/>
+          </a:p>
+          <a:p>
             <a:endParaRPr lang="zh-CN" altLang="en-US" dirty="0"/>
           </a:p>
         </p:txBody>
@@ -3382,7 +3405,7 @@
     </p:spTree>
     <p:extLst>
       <p:ext uri="{BB962C8B-B14F-4D97-AF65-F5344CB8AC3E}">
-        <p14:creationId xmlns:p14="http://schemas.microsoft.com/office/powerpoint/2010/main" val="126388662"/>
+        <p14:creationId xmlns:p14="http://schemas.microsoft.com/office/powerpoint/2010/main" val="792942642"/>
       </p:ext>
     </p:extLst>
   </p:cSld>
@@ -3425,8 +3448,12 @@
           <a:lstStyle/>
           <a:p>
             <a:r>
-              <a:rPr lang="zh-CN" altLang="en-US" dirty="0" smtClean="0"/>
-              <a:t>市场在进一步细分</a:t>
+              <a:rPr lang="en-US" altLang="zh-CN" dirty="0" smtClean="0"/>
+              <a:t>OTA</a:t>
+            </a:r>
+            <a:r>
+              <a:rPr lang="zh-CN" altLang="en-US" dirty="0" smtClean="0"/>
+              <a:t>市场的机会</a:t>
             </a:r>
             <a:endParaRPr lang="zh-CN" altLang="en-US" dirty="0"/>
           </a:p>
@@ -3444,52 +3471,89 @@
         </p:nvSpPr>
         <p:spPr/>
         <p:txBody>
-          <a:bodyPr/>
-          <a:lstStyle/>
-          <a:p>
-            <a:r>
-              <a:rPr lang="zh-CN" altLang="en-US" dirty="0" smtClean="0"/>
-              <a:t>末端</a:t>
-            </a:r>
+          <a:bodyPr>
+            <a:normAutofit fontScale="77500" lnSpcReduction="20000"/>
+          </a:bodyPr>
+          <a:lstStyle/>
+          <a:p>
+            <a:r>
+              <a:rPr lang="zh-CN" altLang="en-US" dirty="0" smtClean="0"/>
+              <a:t>整个旅游业市场的投资规模已经超过万亿（旅游协会）</a:t>
+            </a:r>
+            <a:endParaRPr lang="en-US" altLang="zh-CN" dirty="0" smtClean="0"/>
+          </a:p>
+          <a:p>
             <a:r>
               <a:rPr lang="en-US" altLang="zh-CN" dirty="0" smtClean="0"/>
-              <a:t>IP</a:t>
-            </a:r>
-            <a:r>
-              <a:rPr lang="zh-CN" altLang="en-US" dirty="0" smtClean="0"/>
-              <a:t>化</a:t>
-            </a:r>
-            <a:endParaRPr lang="en-US" altLang="zh-CN" dirty="0" smtClean="0"/>
-          </a:p>
-          <a:p>
-            <a:r>
-              <a:rPr lang="zh-CN" altLang="en-US" dirty="0" smtClean="0"/>
-              <a:t>户外成为热点</a:t>
-            </a:r>
-            <a:endParaRPr lang="en-US" altLang="zh-CN" dirty="0" smtClean="0"/>
-          </a:p>
-          <a:p>
-            <a:r>
-              <a:rPr lang="zh-CN" altLang="en-US" dirty="0"/>
-              <a:t>乡村</a:t>
-            </a:r>
-            <a:r>
-              <a:rPr lang="zh-CN" altLang="en-US" dirty="0" smtClean="0"/>
-              <a:t>旅游投资加大</a:t>
-            </a:r>
-            <a:endParaRPr lang="en-US" altLang="zh-CN" dirty="0" smtClean="0"/>
-          </a:p>
-          <a:p>
-            <a:r>
-              <a:rPr lang="zh-CN" altLang="en-US" dirty="0" smtClean="0"/>
-              <a:t>目的地的基础设施建设趋于饱和</a:t>
-            </a:r>
-            <a:endParaRPr lang="en-US" altLang="zh-CN" dirty="0" smtClean="0"/>
-          </a:p>
-          <a:p>
-            <a:r>
-              <a:rPr lang="zh-CN" altLang="en-US" dirty="0" smtClean="0"/>
-              <a:t>可是：游客还是不知道怎么玩</a:t>
+              <a:t>OTA</a:t>
+            </a:r>
+            <a:r>
+              <a:rPr lang="zh-CN" altLang="en-US" dirty="0" smtClean="0"/>
+              <a:t>市场在整个旅游市场的比重已经近</a:t>
+            </a:r>
+            <a:r>
+              <a:rPr lang="en-US" altLang="zh-CN" dirty="0" smtClean="0"/>
+              <a:t>10%</a:t>
+            </a:r>
+          </a:p>
+          <a:p>
+            <a:r>
+              <a:rPr lang="en-US" altLang="zh-CN" dirty="0" smtClean="0"/>
+              <a:t>2015</a:t>
+            </a:r>
+            <a:r>
+              <a:rPr lang="zh-CN" altLang="en-US" dirty="0" smtClean="0"/>
+              <a:t>年的大并购，逐渐形成了携程</a:t>
+            </a:r>
+            <a:r>
+              <a:rPr lang="en-US" altLang="zh-CN" dirty="0" smtClean="0"/>
+              <a:t>/</a:t>
+            </a:r>
+            <a:r>
+              <a:rPr lang="zh-CN" altLang="en-US" dirty="0" smtClean="0"/>
+              <a:t>去哪儿独大的局面，其他的综合性</a:t>
+            </a:r>
+            <a:r>
+              <a:rPr lang="en-US" altLang="zh-CN" dirty="0" smtClean="0"/>
+              <a:t>OTA</a:t>
+            </a:r>
+            <a:r>
+              <a:rPr lang="zh-CN" altLang="en-US" dirty="0" smtClean="0"/>
+              <a:t>，例如阿里旅行主要在做并购和流水，</a:t>
+            </a:r>
+            <a:endParaRPr lang="en-US" altLang="zh-CN" dirty="0" smtClean="0"/>
+          </a:p>
+          <a:p>
+            <a:r>
+              <a:rPr lang="zh-CN" altLang="en-US" dirty="0" smtClean="0"/>
+              <a:t>他们希望通过将旅游资源扁平化来取代原来导游的功能。但是人文关怀往往是旅游过程中最为精彩的部分，俗话说：玩什么不重要，往往和谁玩才重要；讲述、沟通一站式的服务才是旅游的精髓</a:t>
+            </a:r>
+            <a:endParaRPr lang="en-US" altLang="zh-CN" dirty="0" smtClean="0"/>
+          </a:p>
+          <a:p>
+            <a:r>
+              <a:rPr lang="en-US" altLang="zh-CN" dirty="0"/>
+              <a:t>OTA</a:t>
+            </a:r>
+            <a:r>
+              <a:rPr lang="zh-CN" altLang="en-US" dirty="0" smtClean="0"/>
+              <a:t>旅游投诉逐年上升，主要是</a:t>
+            </a:r>
+            <a:r>
+              <a:rPr lang="en-US" altLang="zh-CN" dirty="0" smtClean="0"/>
+              <a:t>OTA</a:t>
+            </a:r>
+            <a:r>
+              <a:rPr lang="zh-CN" altLang="en-US" dirty="0" smtClean="0"/>
+              <a:t>和他们复杂的下线体系之间的许多信息不对称，以及追求利益最大化造成的，用户觉得在</a:t>
+            </a:r>
+            <a:r>
+              <a:rPr lang="en-US" altLang="zh-CN" dirty="0" smtClean="0"/>
+              <a:t>OTA</a:t>
+            </a:r>
+            <a:r>
+              <a:rPr lang="zh-CN" altLang="en-US" dirty="0" smtClean="0"/>
+              <a:t>上预订完后，就没有后续服务了</a:t>
             </a:r>
             <a:endParaRPr lang="zh-CN" altLang="en-US" dirty="0"/>
           </a:p>
@@ -3498,7 +3562,7 @@
     </p:spTree>
     <p:extLst>
       <p:ext uri="{BB962C8B-B14F-4D97-AF65-F5344CB8AC3E}">
-        <p14:creationId xmlns:p14="http://schemas.microsoft.com/office/powerpoint/2010/main" val="705033769"/>
+        <p14:creationId xmlns:p14="http://schemas.microsoft.com/office/powerpoint/2010/main" val="126388662"/>
       </p:ext>
     </p:extLst>
   </p:cSld>
@@ -3542,7 +3606,7 @@
           <a:p>
             <a:r>
               <a:rPr lang="zh-CN" altLang="en-US" dirty="0" smtClean="0"/>
-              <a:t>新兴市场的机会</a:t>
+              <a:t>市场在进一步细分</a:t>
             </a:r>
             <a:endParaRPr lang="zh-CN" altLang="en-US" dirty="0"/>
           </a:p>
@@ -3560,179 +3624,12 @@
         </p:nvSpPr>
         <p:spPr/>
         <p:txBody>
-          <a:bodyPr>
-            <a:normAutofit fontScale="55000" lnSpcReduction="20000"/>
-          </a:bodyPr>
-          <a:lstStyle/>
-          <a:p>
-            <a:r>
-              <a:rPr lang="zh-CN" altLang="en-US" dirty="0" smtClean="0"/>
-              <a:t>自助游的</a:t>
-            </a:r>
-            <a:r>
-              <a:rPr lang="en-US" altLang="zh-CN" dirty="0" smtClean="0"/>
-              <a:t>OTA</a:t>
-            </a:r>
-            <a:r>
-              <a:rPr lang="zh-CN" altLang="en-US" dirty="0" smtClean="0"/>
-              <a:t>，主要还是卖线路，将游客卖给当地的地接社，换汤不换药</a:t>
-            </a:r>
-            <a:endParaRPr lang="en-US" altLang="zh-CN" dirty="0" smtClean="0"/>
-          </a:p>
-          <a:p>
-            <a:pPr lvl="1"/>
-            <a:r>
-              <a:rPr lang="zh-CN" altLang="en-US" dirty="0" smtClean="0"/>
-              <a:t>线路模式：指定线路</a:t>
-            </a:r>
-            <a:r>
-              <a:rPr lang="en-US" altLang="zh-CN" dirty="0" smtClean="0"/>
-              <a:t>-》</a:t>
-            </a:r>
-            <a:r>
-              <a:rPr lang="zh-CN" altLang="en-US" dirty="0" smtClean="0"/>
-              <a:t>用户选择商品</a:t>
-            </a:r>
-            <a:r>
-              <a:rPr lang="en-US" altLang="zh-CN" dirty="0" smtClean="0"/>
-              <a:t>-》</a:t>
-            </a:r>
-            <a:r>
-              <a:rPr lang="zh-CN" altLang="en-US" dirty="0" smtClean="0"/>
-              <a:t>人满就走，不满不走</a:t>
-            </a:r>
-            <a:r>
-              <a:rPr lang="en-US" altLang="zh-CN" dirty="0" smtClean="0"/>
-              <a:t>-》</a:t>
-            </a:r>
-            <a:r>
-              <a:rPr lang="zh-CN" altLang="en-US" dirty="0" smtClean="0"/>
-              <a:t>上车睡觉，景点拍照</a:t>
-            </a:r>
-            <a:endParaRPr lang="en-US" altLang="zh-CN" dirty="0" smtClean="0"/>
-          </a:p>
-          <a:p>
-            <a:pPr lvl="1"/>
-            <a:r>
-              <a:rPr lang="zh-CN" altLang="en-US" dirty="0" smtClean="0"/>
-              <a:t>用户没有自主权，决定什么时候出行（受开团的限制）、玩什么（景点固定）、怎么玩（到点出发，按时集合）、和谁玩（都是陌生人）</a:t>
-            </a:r>
-            <a:endParaRPr lang="en-US" altLang="zh-CN" dirty="0" smtClean="0"/>
-          </a:p>
-          <a:p>
-            <a:r>
-              <a:rPr lang="zh-CN" altLang="en-US" dirty="0" smtClean="0"/>
-              <a:t>一些以游记起家的</a:t>
-            </a:r>
-            <a:r>
-              <a:rPr lang="en-US" altLang="zh-CN" dirty="0" smtClean="0"/>
-              <a:t>OTA</a:t>
-            </a:r>
-            <a:r>
-              <a:rPr lang="zh-CN" altLang="en-US" dirty="0" smtClean="0"/>
-              <a:t>，没有盈利模式，也转向了卖线路</a:t>
-            </a:r>
-            <a:endParaRPr lang="en-US" altLang="zh-CN" dirty="0" smtClean="0"/>
-          </a:p>
-          <a:p>
-            <a:pPr lvl="1"/>
-            <a:r>
-              <a:rPr lang="zh-CN" altLang="en-US" dirty="0" smtClean="0"/>
-              <a:t>用户看游记</a:t>
-            </a:r>
-            <a:r>
-              <a:rPr lang="en-US" altLang="zh-CN" dirty="0" smtClean="0"/>
-              <a:t>-》</a:t>
-            </a:r>
-            <a:r>
-              <a:rPr lang="zh-CN" altLang="en-US" dirty="0" smtClean="0"/>
-              <a:t>自己制定行程，或者</a:t>
-            </a:r>
-            <a:r>
-              <a:rPr lang="en-US" altLang="zh-CN" dirty="0" smtClean="0"/>
-              <a:t>-》</a:t>
-            </a:r>
-            <a:r>
-              <a:rPr lang="zh-CN" altLang="en-US" dirty="0" smtClean="0"/>
-              <a:t>购买行程，与自助游</a:t>
-            </a:r>
-            <a:r>
-              <a:rPr lang="en-US" altLang="zh-CN" dirty="0" smtClean="0"/>
-              <a:t>OTA</a:t>
-            </a:r>
-            <a:r>
-              <a:rPr lang="zh-CN" altLang="en-US" dirty="0" smtClean="0"/>
-              <a:t>没差</a:t>
-            </a:r>
-            <a:endParaRPr lang="en-US" altLang="zh-CN" dirty="0" smtClean="0"/>
-          </a:p>
-          <a:p>
-            <a:r>
-              <a:rPr lang="zh-CN" altLang="en-US" dirty="0" smtClean="0"/>
-              <a:t>当地人逐渐成为热点，但是：</a:t>
-            </a:r>
-            <a:endParaRPr lang="en-US" altLang="zh-CN" dirty="0" smtClean="0"/>
-          </a:p>
-          <a:p>
-            <a:pPr lvl="1"/>
-            <a:r>
-              <a:rPr lang="zh-CN" altLang="en-US" dirty="0" smtClean="0"/>
-              <a:t>没有监管机制，服务好不好看运气</a:t>
-            </a:r>
-            <a:endParaRPr lang="en-US" altLang="zh-CN" dirty="0" smtClean="0"/>
-          </a:p>
-          <a:p>
-            <a:pPr lvl="1"/>
-            <a:r>
-              <a:rPr lang="zh-CN" altLang="en-US" dirty="0"/>
-              <a:t>简单</a:t>
-            </a:r>
-            <a:r>
-              <a:rPr lang="zh-CN" altLang="en-US" dirty="0" smtClean="0"/>
-              <a:t>地磋商，没有类似</a:t>
-            </a:r>
-            <a:r>
-              <a:rPr lang="en-US" altLang="zh-CN" dirty="0" smtClean="0"/>
-              <a:t>UBER</a:t>
-            </a:r>
-            <a:r>
-              <a:rPr lang="zh-CN" altLang="en-US" dirty="0" smtClean="0"/>
-              <a:t>一样的行程展示</a:t>
-            </a:r>
-            <a:endParaRPr lang="en-US" altLang="zh-CN" dirty="0" smtClean="0"/>
-          </a:p>
-          <a:p>
-            <a:pPr lvl="1"/>
-            <a:r>
-              <a:rPr lang="zh-CN" altLang="en-US" dirty="0" smtClean="0"/>
-              <a:t>部分有制定行程功能，但是也没有事后跟踪</a:t>
-            </a:r>
-            <a:endParaRPr lang="en-US" altLang="zh-CN" dirty="0" smtClean="0"/>
-          </a:p>
-          <a:p>
-            <a:pPr lvl="1"/>
-            <a:r>
-              <a:rPr lang="zh-CN" altLang="en-US" dirty="0" smtClean="0"/>
-              <a:t>还是主要做一些境外游，一些对当地文化一知半解的留学生捞外快，不是当地人在服务</a:t>
-            </a:r>
-            <a:endParaRPr lang="en-US" altLang="zh-CN" dirty="0" smtClean="0"/>
-          </a:p>
-          <a:p>
-            <a:r>
-              <a:rPr lang="zh-CN" altLang="en-US" dirty="0"/>
-              <a:t>垂直</a:t>
-            </a:r>
-            <a:r>
-              <a:rPr lang="zh-CN" altLang="en-US" dirty="0" smtClean="0"/>
-              <a:t>类的</a:t>
-            </a:r>
-            <a:r>
-              <a:rPr lang="en-US" altLang="zh-CN" dirty="0" smtClean="0"/>
-              <a:t>OTA</a:t>
-            </a:r>
-            <a:r>
-              <a:rPr lang="zh-CN" altLang="en-US" dirty="0" smtClean="0"/>
-              <a:t>，逐渐在</a:t>
+          <a:bodyPr/>
+          <a:lstStyle/>
+          <a:p>
+            <a:r>
+              <a:rPr lang="zh-CN" altLang="en-US" dirty="0" smtClean="0"/>
+              <a:t>末端碎片化，</a:t>
             </a:r>
             <a:r>
               <a:rPr lang="en-US" altLang="zh-CN" dirty="0" smtClean="0"/>
@@ -3745,35 +3642,32 @@
             <a:endParaRPr lang="en-US" altLang="zh-CN" dirty="0" smtClean="0"/>
           </a:p>
           <a:p>
-            <a:pPr lvl="1"/>
-            <a:r>
-              <a:rPr lang="zh-CN" altLang="en-US" dirty="0" smtClean="0"/>
-              <a:t>达人才是最好的</a:t>
-            </a:r>
-            <a:r>
-              <a:rPr lang="en-US" altLang="zh-CN" dirty="0" smtClean="0"/>
-              <a:t>IP</a:t>
-            </a:r>
-            <a:r>
-              <a:rPr lang="zh-CN" altLang="en-US" dirty="0" smtClean="0"/>
-              <a:t>聚合体</a:t>
-            </a:r>
-            <a:endParaRPr lang="en-US" altLang="zh-CN" dirty="0" smtClean="0"/>
-          </a:p>
-          <a:p>
-            <a:pPr lvl="1"/>
-            <a:r>
-              <a:rPr lang="zh-CN" altLang="en-US" dirty="0" smtClean="0"/>
-              <a:t>目的地需要人文化的推广</a:t>
-            </a:r>
-            <a:endParaRPr lang="en-US" altLang="zh-CN" dirty="0" smtClean="0"/>
+            <a:r>
+              <a:rPr lang="zh-CN" altLang="en-US" dirty="0" smtClean="0"/>
+              <a:t>乡村旅游投资加大</a:t>
+            </a:r>
+            <a:endParaRPr lang="en-US" altLang="zh-CN" dirty="0" smtClean="0"/>
+          </a:p>
+          <a:p>
+            <a:r>
+              <a:rPr lang="zh-CN" altLang="en-US" dirty="0" smtClean="0"/>
+              <a:t>目的地的基础设施建设趋于饱和</a:t>
+            </a:r>
+            <a:endParaRPr lang="en-US" altLang="zh-CN" dirty="0" smtClean="0"/>
+          </a:p>
+          <a:p>
+            <a:r>
+              <a:rPr lang="zh-CN" altLang="en-US" dirty="0" smtClean="0"/>
+              <a:t>可是：游客还是不知道怎么玩</a:t>
+            </a:r>
+            <a:endParaRPr lang="zh-CN" altLang="en-US" dirty="0"/>
           </a:p>
         </p:txBody>
       </p:sp>
     </p:spTree>
     <p:extLst>
       <p:ext uri="{BB962C8B-B14F-4D97-AF65-F5344CB8AC3E}">
-        <p14:creationId xmlns:p14="http://schemas.microsoft.com/office/powerpoint/2010/main" val="1642191626"/>
+        <p14:creationId xmlns:p14="http://schemas.microsoft.com/office/powerpoint/2010/main" val="705033769"/>
       </p:ext>
     </p:extLst>
   </p:cSld>
@@ -3816,88 +3710,155 @@
           <a:lstStyle/>
           <a:p>
             <a:r>
+              <a:rPr lang="zh-CN" altLang="en-US" dirty="0" smtClean="0"/>
+              <a:t>新兴市场的机会</a:t>
+            </a:r>
+            <a:endParaRPr lang="zh-CN" altLang="en-US" dirty="0"/>
+          </a:p>
+        </p:txBody>
+      </p:sp>
+      <p:sp>
+        <p:nvSpPr>
+          <p:cNvPr id="3" name="内容占位符 2"/>
+          <p:cNvSpPr>
+            <a:spLocks noGrp="1"/>
+          </p:cNvSpPr>
+          <p:nvPr>
+            <p:ph idx="1"/>
+          </p:nvPr>
+        </p:nvSpPr>
+        <p:spPr/>
+        <p:txBody>
+          <a:bodyPr>
+            <a:normAutofit fontScale="55000" lnSpcReduction="20000"/>
+          </a:bodyPr>
+          <a:lstStyle/>
+          <a:p>
+            <a:r>
+              <a:rPr lang="zh-CN" altLang="en-US" dirty="0" smtClean="0"/>
+              <a:t>自助游的</a:t>
+            </a:r>
+            <a:r>
+              <a:rPr lang="en-US" altLang="zh-CN" dirty="0" smtClean="0"/>
+              <a:t>OTA</a:t>
+            </a:r>
+            <a:r>
+              <a:rPr lang="zh-CN" altLang="en-US" dirty="0" smtClean="0"/>
+              <a:t>，主要还是卖线路，将游客卖给当地的地接社，换汤不换药</a:t>
+            </a:r>
+            <a:endParaRPr lang="en-US" altLang="zh-CN" dirty="0" smtClean="0"/>
+          </a:p>
+          <a:p>
+            <a:pPr lvl="1"/>
+            <a:r>
+              <a:rPr lang="zh-CN" altLang="en-US" dirty="0" smtClean="0"/>
+              <a:t>线路模式：指定线路</a:t>
+            </a:r>
+            <a:r>
+              <a:rPr lang="en-US" altLang="zh-CN" dirty="0" smtClean="0"/>
+              <a:t>-》</a:t>
+            </a:r>
+            <a:r>
+              <a:rPr lang="zh-CN" altLang="en-US" dirty="0" smtClean="0"/>
+              <a:t>用户选择商品</a:t>
+            </a:r>
+            <a:r>
+              <a:rPr lang="en-US" altLang="zh-CN" dirty="0" smtClean="0"/>
+              <a:t>-》</a:t>
+            </a:r>
+            <a:r>
+              <a:rPr lang="zh-CN" altLang="en-US" dirty="0" smtClean="0"/>
+              <a:t>人满就走，不满不走</a:t>
+            </a:r>
+            <a:r>
+              <a:rPr lang="en-US" altLang="zh-CN" dirty="0" smtClean="0"/>
+              <a:t>-》</a:t>
+            </a:r>
+            <a:r>
+              <a:rPr lang="zh-CN" altLang="en-US" dirty="0" smtClean="0"/>
+              <a:t>上车睡觉，景点拍照</a:t>
+            </a:r>
+            <a:endParaRPr lang="en-US" altLang="zh-CN" dirty="0" smtClean="0"/>
+          </a:p>
+          <a:p>
+            <a:pPr lvl="1"/>
+            <a:r>
+              <a:rPr lang="zh-CN" altLang="en-US" dirty="0" smtClean="0"/>
+              <a:t>用户没有自主权，决定什么时候出行（受开团的限制）、玩什么（景点固定）、怎么玩（到点出发，按时集合）、和谁玩（都是陌生人）</a:t>
+            </a:r>
+            <a:endParaRPr lang="en-US" altLang="zh-CN" dirty="0" smtClean="0"/>
+          </a:p>
+          <a:p>
+            <a:r>
+              <a:rPr lang="zh-CN" altLang="en-US" dirty="0" smtClean="0"/>
+              <a:t>一些以游记起家的</a:t>
+            </a:r>
+            <a:r>
+              <a:rPr lang="en-US" altLang="zh-CN" dirty="0" smtClean="0"/>
+              <a:t>OTA</a:t>
+            </a:r>
+            <a:r>
+              <a:rPr lang="zh-CN" altLang="en-US" dirty="0" smtClean="0"/>
+              <a:t>，没有盈利模式，也转向了卖线路</a:t>
+            </a:r>
+            <a:endParaRPr lang="en-US" altLang="zh-CN" dirty="0" smtClean="0"/>
+          </a:p>
+          <a:p>
+            <a:pPr lvl="1"/>
+            <a:r>
+              <a:rPr lang="zh-CN" altLang="en-US" dirty="0" smtClean="0"/>
+              <a:t>用户看游记</a:t>
+            </a:r>
+            <a:r>
+              <a:rPr lang="en-US" altLang="zh-CN" dirty="0" smtClean="0"/>
+              <a:t>-》</a:t>
+            </a:r>
+            <a:r>
+              <a:rPr lang="zh-CN" altLang="en-US" dirty="0" smtClean="0"/>
+              <a:t>自己制定行程，或者</a:t>
+            </a:r>
+            <a:r>
+              <a:rPr lang="en-US" altLang="zh-CN" dirty="0" smtClean="0"/>
+              <a:t>-》</a:t>
+            </a:r>
+            <a:r>
+              <a:rPr lang="zh-CN" altLang="en-US" dirty="0" smtClean="0"/>
+              <a:t>购买行程，与自助游</a:t>
+            </a:r>
+            <a:r>
+              <a:rPr lang="en-US" altLang="zh-CN" dirty="0" smtClean="0"/>
+              <a:t>OTA</a:t>
+            </a:r>
+            <a:r>
+              <a:rPr lang="zh-CN" altLang="en-US" dirty="0" smtClean="0"/>
+              <a:t>没差</a:t>
+            </a:r>
+            <a:endParaRPr lang="en-US" altLang="zh-CN" dirty="0" smtClean="0"/>
+          </a:p>
+          <a:p>
+            <a:r>
+              <a:rPr lang="zh-CN" altLang="en-US" dirty="0" smtClean="0"/>
+              <a:t>当地人逐渐成为热点，但是：</a:t>
+            </a:r>
+            <a:endParaRPr lang="en-US" altLang="zh-CN" dirty="0" smtClean="0"/>
+          </a:p>
+          <a:p>
+            <a:pPr lvl="1"/>
+            <a:r>
+              <a:rPr lang="zh-CN" altLang="en-US" dirty="0" smtClean="0"/>
+              <a:t>没有监管机制，服务好不好看运气</a:t>
+            </a:r>
+            <a:endParaRPr lang="en-US" altLang="zh-CN" dirty="0" smtClean="0"/>
+          </a:p>
+          <a:p>
+            <a:pPr lvl="1"/>
+            <a:r>
               <a:rPr lang="zh-CN" altLang="en-US" dirty="0"/>
-              <a:t>旅游各</a:t>
-            </a:r>
-            <a:r>
-              <a:rPr lang="zh-CN" altLang="en-US" dirty="0" smtClean="0"/>
-              <a:t>要素面临的挑战</a:t>
-            </a:r>
-            <a:endParaRPr lang="zh-CN" altLang="en-US" dirty="0"/>
-          </a:p>
-        </p:txBody>
-      </p:sp>
-      <p:sp>
-        <p:nvSpPr>
-          <p:cNvPr id="3" name="内容占位符 2"/>
-          <p:cNvSpPr>
-            <a:spLocks noGrp="1"/>
-          </p:cNvSpPr>
-          <p:nvPr>
-            <p:ph idx="1"/>
-          </p:nvPr>
-        </p:nvSpPr>
-        <p:spPr/>
-        <p:txBody>
-          <a:bodyPr>
-            <a:normAutofit fontScale="47500" lnSpcReduction="20000"/>
-          </a:bodyPr>
-          <a:lstStyle/>
-          <a:p>
-            <a:r>
-              <a:rPr lang="zh-CN" altLang="en-US" dirty="0" smtClean="0"/>
-              <a:t>吃</a:t>
-            </a:r>
-            <a:endParaRPr lang="en-US" altLang="zh-CN" dirty="0" smtClean="0"/>
-          </a:p>
-          <a:p>
-            <a:pPr lvl="1"/>
-            <a:r>
-              <a:rPr lang="zh-CN" altLang="en-US" dirty="0"/>
-              <a:t>团</a:t>
-            </a:r>
-            <a:r>
-              <a:rPr lang="zh-CN" altLang="en-US" dirty="0" smtClean="0"/>
-              <a:t>餐不是游客所期待的，果腹而已</a:t>
-            </a:r>
-            <a:endParaRPr lang="en-US" altLang="zh-CN" dirty="0" smtClean="0"/>
-          </a:p>
-          <a:p>
-            <a:pPr lvl="1"/>
-            <a:r>
-              <a:rPr lang="zh-CN" altLang="en-US" dirty="0" smtClean="0"/>
-              <a:t>某评、某团商业化气息越来愈浓，本地人到底吃什么只有作为本地人的达人知道，所谓吃货达人</a:t>
-            </a:r>
-            <a:endParaRPr lang="en-US" altLang="zh-CN" dirty="0" smtClean="0"/>
-          </a:p>
-          <a:p>
-            <a:pPr lvl="1"/>
-            <a:r>
-              <a:rPr lang="zh-CN" altLang="en-US" dirty="0" smtClean="0"/>
-              <a:t>一些美食的传承，当地人才知道，例如徽菜的厨师以“胡姓”为佳，你知道吗？下次你去那些所谓正宗徽菜的饭店，可以大叫一声：“请问大厨贵姓？”</a:t>
-            </a:r>
-            <a:endParaRPr lang="en-US" altLang="zh-CN" dirty="0" smtClean="0"/>
-          </a:p>
-          <a:p>
-            <a:pPr lvl="1"/>
-            <a:r>
-              <a:rPr lang="zh-CN" altLang="en-US" dirty="0" smtClean="0"/>
-              <a:t>“舌尖上的中国”说的是饮食，但是大多数时间都是在说食材的获取，那些珍贵的食材的获取，你想不想体验一把？</a:t>
-            </a:r>
-            <a:endParaRPr lang="en-US" altLang="zh-CN" dirty="0" smtClean="0"/>
-          </a:p>
-          <a:p>
-            <a:r>
-              <a:rPr lang="zh-CN" altLang="en-US" dirty="0" smtClean="0"/>
-              <a:t>行</a:t>
-            </a:r>
-            <a:endParaRPr lang="en-US" altLang="zh-CN" dirty="0" smtClean="0"/>
-          </a:p>
-          <a:p>
-            <a:pPr lvl="1"/>
-            <a:r>
-              <a:rPr lang="zh-CN" altLang="en-US" dirty="0" smtClean="0"/>
-              <a:t>机票、火车票、长途客运价格透明，可是到了本地怎么办，本地出租车普遍斩客现象严重，</a:t>
+              <a:t>简单</a:t>
+            </a:r>
+            <a:r>
+              <a:rPr lang="zh-CN" altLang="en-US" dirty="0" smtClean="0"/>
+              <a:t>地磋商，没有类似</a:t>
             </a:r>
             <a:r>
               <a:rPr lang="en-US" altLang="zh-CN" dirty="0" smtClean="0"/>
@@ -3905,127 +3866,83 @@
             </a:r>
             <a:r>
               <a:rPr lang="zh-CN" altLang="en-US" dirty="0" smtClean="0"/>
-              <a:t>只覆盖了一二级城市，达人可以来接送，一站式搞定</a:t>
-            </a:r>
-            <a:endParaRPr lang="en-US" altLang="zh-CN" dirty="0" smtClean="0"/>
-          </a:p>
-          <a:p>
-            <a:pPr lvl="1"/>
-            <a:r>
-              <a:rPr lang="zh-CN" altLang="en-US" dirty="0" smtClean="0"/>
-              <a:t>即时游客喜欢享受驾驶的乐趣，但是本地的部分道路，部分只有熟悉本地情况的司机才能胜任</a:t>
-            </a:r>
-            <a:endParaRPr lang="en-US" altLang="zh-CN" dirty="0" smtClean="0"/>
-          </a:p>
-          <a:p>
-            <a:r>
-              <a:rPr lang="zh-CN" altLang="en-US" dirty="0" smtClean="0"/>
-              <a:t>住</a:t>
-            </a:r>
-            <a:endParaRPr lang="en-US" altLang="zh-CN" dirty="0" smtClean="0"/>
-          </a:p>
-          <a:p>
-            <a:pPr lvl="1"/>
-            <a:r>
-              <a:rPr lang="zh-CN" altLang="en-US" dirty="0" smtClean="0"/>
-              <a:t>酒店已经扁平化，但是在线预订无法满足个性化的需求，例如为节省时间提前开房，但是前一批游客经常还未退房；加床、</a:t>
+              <a:t>一样的行程展示</a:t>
+            </a:r>
+            <a:endParaRPr lang="en-US" altLang="zh-CN" dirty="0" smtClean="0"/>
+          </a:p>
+          <a:p>
+            <a:pPr lvl="1"/>
+            <a:r>
+              <a:rPr lang="zh-CN" altLang="en-US" dirty="0" smtClean="0"/>
+              <a:t>部分有制定行程功能，但是也没有事后跟踪</a:t>
+            </a:r>
+            <a:endParaRPr lang="en-US" altLang="zh-CN" dirty="0" smtClean="0"/>
+          </a:p>
+          <a:p>
+            <a:pPr lvl="1"/>
+            <a:r>
+              <a:rPr lang="zh-CN" altLang="en-US" dirty="0" smtClean="0"/>
+              <a:t>还是主要做一些境外游，一些对当地文化一知半解的留学生捞外快，不是当地人在服务</a:t>
+            </a:r>
+            <a:endParaRPr lang="en-US" altLang="zh-CN" dirty="0" smtClean="0"/>
+          </a:p>
+          <a:p>
+            <a:r>
+              <a:rPr lang="zh-CN" altLang="en-US" dirty="0"/>
+              <a:t>垂直</a:t>
+            </a:r>
+            <a:r>
+              <a:rPr lang="zh-CN" altLang="en-US" dirty="0" smtClean="0"/>
+              <a:t>类的</a:t>
             </a:r>
             <a:r>
               <a:rPr lang="en-US" altLang="zh-CN" dirty="0" smtClean="0"/>
-              <a:t>View</a:t>
-            </a:r>
-            <a:r>
-              <a:rPr lang="zh-CN" altLang="en-US" dirty="0" smtClean="0"/>
-              <a:t>、无烟层、</a:t>
+              <a:t>OTA</a:t>
+            </a:r>
+            <a:r>
+              <a:rPr lang="zh-CN" altLang="en-US" dirty="0" smtClean="0"/>
+              <a:t>，逐渐在</a:t>
             </a:r>
             <a:r>
               <a:rPr lang="en-US" altLang="zh-CN" dirty="0" smtClean="0"/>
-              <a:t>King-size</a:t>
-            </a:r>
-            <a:r>
-              <a:rPr lang="zh-CN" altLang="en-US" dirty="0" smtClean="0"/>
-              <a:t>，还有一些非常特殊的订房需求，达人可以提前预先帮你搞定</a:t>
-            </a:r>
-            <a:endParaRPr lang="en-US" altLang="zh-CN" dirty="0" smtClean="0"/>
-          </a:p>
-          <a:p>
-            <a:r>
-              <a:rPr lang="zh-CN" altLang="en-US" dirty="0" smtClean="0"/>
-              <a:t>玩</a:t>
-            </a:r>
-            <a:endParaRPr lang="en-US" altLang="zh-CN" dirty="0" smtClean="0"/>
-          </a:p>
-          <a:p>
-            <a:pPr lvl="1"/>
+              <a:t>IP</a:t>
+            </a:r>
+            <a:r>
+              <a:rPr lang="zh-CN" altLang="en-US" dirty="0" smtClean="0"/>
+              <a:t>化</a:t>
+            </a:r>
+            <a:endParaRPr lang="en-US" altLang="zh-CN" dirty="0" smtClean="0"/>
+          </a:p>
+          <a:p>
+            <a:pPr lvl="1"/>
+            <a:r>
+              <a:rPr lang="zh-CN" altLang="en-US" dirty="0" smtClean="0"/>
+              <a:t>达人才是最好的</a:t>
+            </a:r>
             <a:r>
               <a:rPr lang="en-US" altLang="zh-CN" dirty="0" smtClean="0"/>
-              <a:t>4A</a:t>
-            </a:r>
-            <a:r>
-              <a:rPr lang="zh-CN" altLang="en-US" dirty="0" smtClean="0"/>
-              <a:t>、</a:t>
-            </a:r>
-            <a:r>
-              <a:rPr lang="en-US" altLang="zh-CN" dirty="0" smtClean="0"/>
-              <a:t>5A</a:t>
-            </a:r>
-            <a:r>
-              <a:rPr lang="zh-CN" altLang="en-US" dirty="0" smtClean="0"/>
-              <a:t>只是有些财团包装了一下的景点而已，资深游客才知道，其实更多的好玩的地方在民间，达人可以带你去，跟你说说那些地方老八辈的故事和传说</a:t>
-            </a:r>
-            <a:endParaRPr lang="en-US" altLang="zh-CN" dirty="0" smtClean="0"/>
-          </a:p>
-          <a:p>
-            <a:r>
-              <a:rPr lang="zh-CN" altLang="en-US" dirty="0" smtClean="0"/>
-              <a:t>特产</a:t>
-            </a:r>
-            <a:endParaRPr lang="en-US" altLang="zh-CN" dirty="0" smtClean="0"/>
-          </a:p>
-          <a:p>
-            <a:pPr lvl="1"/>
-            <a:r>
-              <a:rPr lang="zh-CN" altLang="en-US" dirty="0" smtClean="0"/>
-              <a:t>那些从当地卖到你居住的城市的东西真的就是特产吗？一些好东西你不去当地是看不到的。例如问政山的笋，比安吉的更白更嫩；歙县的新鲜甘蔗口感比广东和湖南的要好；遂昌有种食品叫黄米果你知道怎么做的吗？</a:t>
-            </a:r>
-            <a:endParaRPr lang="en-US" altLang="zh-CN" dirty="0" smtClean="0"/>
-          </a:p>
-          <a:p>
-            <a:pPr marL="0" indent="0" algn="ctr">
-              <a:buNone/>
-            </a:pPr>
-            <a:r>
-              <a:rPr lang="zh-CN" altLang="en-US" sz="3800" b="1" dirty="0">
-                <a:solidFill>
-                  <a:srgbClr val="FF0000"/>
-                </a:solidFill>
-              </a:rPr>
-              <a:t>这</a:t>
-            </a:r>
-            <a:r>
-              <a:rPr lang="zh-CN" altLang="en-US" sz="3800" b="1" dirty="0" smtClean="0">
-                <a:solidFill>
-                  <a:srgbClr val="FF0000"/>
-                </a:solidFill>
-              </a:rPr>
-              <a:t>才是像当地人一样生活</a:t>
-            </a:r>
-            <a:endParaRPr lang="en-US" altLang="zh-CN" sz="3800" b="1" dirty="0" smtClean="0">
-              <a:solidFill>
-                <a:srgbClr val="FF0000"/>
-              </a:solidFill>
-            </a:endParaRPr>
-          </a:p>
-          <a:p>
-            <a:pPr lvl="1"/>
-            <a:endParaRPr lang="zh-CN" altLang="en-US" dirty="0"/>
+              <a:t>IP</a:t>
+            </a:r>
+            <a:r>
+              <a:rPr lang="zh-CN" altLang="en-US" dirty="0" smtClean="0"/>
+              <a:t>聚合体</a:t>
+            </a:r>
+            <a:endParaRPr lang="en-US" altLang="zh-CN" dirty="0" smtClean="0"/>
+          </a:p>
+          <a:p>
+            <a:pPr lvl="1"/>
+            <a:r>
+              <a:rPr lang="zh-CN" altLang="en-US" dirty="0" smtClean="0"/>
+              <a:t>目的地需要人文化的推广</a:t>
+            </a:r>
+            <a:endParaRPr lang="en-US" altLang="zh-CN" dirty="0" smtClean="0"/>
           </a:p>
         </p:txBody>
       </p:sp>
     </p:spTree>
     <p:extLst>
       <p:ext uri="{BB962C8B-B14F-4D97-AF65-F5344CB8AC3E}">
-        <p14:creationId xmlns:p14="http://schemas.microsoft.com/office/powerpoint/2010/main" val="3136019531"/>
+        <p14:creationId xmlns:p14="http://schemas.microsoft.com/office/powerpoint/2010/main" val="1642191626"/>
       </p:ext>
     </p:extLst>
   </p:cSld>
@@ -4064,45 +3981,231 @@
         </p:nvSpPr>
         <p:spPr/>
         <p:txBody>
+          <a:bodyPr/>
+          <a:lstStyle/>
+          <a:p>
+            <a:r>
+              <a:rPr lang="zh-CN" altLang="en-US" dirty="0"/>
+              <a:t>旅游各</a:t>
+            </a:r>
+            <a:r>
+              <a:rPr lang="zh-CN" altLang="en-US" dirty="0" smtClean="0"/>
+              <a:t>要素面临的挑战</a:t>
+            </a:r>
+            <a:endParaRPr lang="zh-CN" altLang="en-US" dirty="0"/>
+          </a:p>
+        </p:txBody>
+      </p:sp>
+      <p:sp>
+        <p:nvSpPr>
+          <p:cNvPr id="3" name="内容占位符 2"/>
+          <p:cNvSpPr>
+            <a:spLocks noGrp="1"/>
+          </p:cNvSpPr>
+          <p:nvPr>
+            <p:ph idx="1"/>
+          </p:nvPr>
+        </p:nvSpPr>
+        <p:spPr/>
+        <p:txBody>
           <a:bodyPr>
-            <a:normAutofit/>
+            <a:normAutofit fontScale="40000" lnSpcReduction="20000"/>
           </a:bodyPr>
           <a:lstStyle/>
           <a:p>
             <a:r>
               <a:rPr lang="zh-CN" altLang="en-US" dirty="0" smtClean="0"/>
-              <a:t>旅行车</a:t>
-            </a:r>
-            <a:endParaRPr lang="zh-CN" altLang="en-US" dirty="0"/>
-          </a:p>
-        </p:txBody>
-      </p:sp>
-      <p:sp>
-        <p:nvSpPr>
-          <p:cNvPr id="3" name="内容占位符 2"/>
-          <p:cNvSpPr>
-            <a:spLocks noGrp="1"/>
-          </p:cNvSpPr>
-          <p:nvPr>
-            <p:ph idx="1"/>
-          </p:nvPr>
-        </p:nvSpPr>
-        <p:spPr/>
-        <p:txBody>
-          <a:bodyPr/>
-          <a:lstStyle/>
-          <a:p>
-            <a:r>
-              <a:rPr lang="zh-CN" altLang="en-US" dirty="0" smtClean="0"/>
-              <a:t>游客出行一般是先确定一个目的地，但是对于在目的地玩什么往往是盲目的</a:t>
-            </a:r>
-            <a:endParaRPr lang="en-US" altLang="zh-CN" dirty="0" smtClean="0"/>
-          </a:p>
-          <a:p>
-            <a:r>
-              <a:rPr lang="zh-CN" altLang="en-US" dirty="0" smtClean="0"/>
-              <a:t>游客可以把浏览过程中感兴趣的玩点、达人、服务标注“想玩”，或者直接加入旅行车，用户点击行程开始后，自动进行智能行程匹配、服务预定</a:t>
-            </a:r>
+              <a:t>吃</a:t>
+            </a:r>
+            <a:endParaRPr lang="en-US" altLang="zh-CN" dirty="0" smtClean="0"/>
+          </a:p>
+          <a:p>
+            <a:pPr lvl="1"/>
+            <a:r>
+              <a:rPr lang="zh-CN" altLang="en-US" dirty="0"/>
+              <a:t>团</a:t>
+            </a:r>
+            <a:r>
+              <a:rPr lang="zh-CN" altLang="en-US" dirty="0" smtClean="0"/>
+              <a:t>餐不是游客所期待的，果腹而已</a:t>
+            </a:r>
+            <a:endParaRPr lang="en-US" altLang="zh-CN" dirty="0" smtClean="0"/>
+          </a:p>
+          <a:p>
+            <a:pPr lvl="1"/>
+            <a:r>
+              <a:rPr lang="zh-CN" altLang="en-US" dirty="0" smtClean="0"/>
+              <a:t>某评、某团商业化气息越来愈浓，本地人到底吃什么只有作为本地人的达人知道，所谓吃货达人</a:t>
+            </a:r>
+            <a:endParaRPr lang="en-US" altLang="zh-CN" dirty="0" smtClean="0"/>
+          </a:p>
+          <a:p>
+            <a:pPr lvl="1"/>
+            <a:r>
+              <a:rPr lang="zh-CN" altLang="en-US" dirty="0" smtClean="0"/>
+              <a:t>一些美食的传承，当地人才知道，例如徽菜的厨师以“胡姓”为佳，你知道吗？下次你去那些所谓正宗徽菜的饭店，可以大叫一声：“请问大厨贵姓？”</a:t>
+            </a:r>
+            <a:endParaRPr lang="en-US" altLang="zh-CN" dirty="0" smtClean="0"/>
+          </a:p>
+          <a:p>
+            <a:pPr lvl="1"/>
+            <a:r>
+              <a:rPr lang="zh-CN" altLang="en-US" dirty="0" smtClean="0"/>
+              <a:t>“舌尖上的中国”说的是饮食，但是大多数时间都是在说食材的获取，那些珍贵的食材的获取，你想不想体验一把？</a:t>
+            </a:r>
+            <a:endParaRPr lang="en-US" altLang="zh-CN" dirty="0" smtClean="0"/>
+          </a:p>
+          <a:p>
+            <a:r>
+              <a:rPr lang="zh-CN" altLang="en-US" dirty="0" smtClean="0"/>
+              <a:t>行</a:t>
+            </a:r>
+            <a:endParaRPr lang="en-US" altLang="zh-CN" dirty="0" smtClean="0"/>
+          </a:p>
+          <a:p>
+            <a:pPr lvl="1"/>
+            <a:r>
+              <a:rPr lang="zh-CN" altLang="en-US" dirty="0" smtClean="0"/>
+              <a:t>机票、火车票、长途客运价格透明，可是到了本地怎么办，本地出租车普遍斩客现象严重，</a:t>
+            </a:r>
+            <a:r>
+              <a:rPr lang="en-US" altLang="zh-CN" dirty="0" smtClean="0"/>
+              <a:t>UBER</a:t>
+            </a:r>
+            <a:r>
+              <a:rPr lang="zh-CN" altLang="en-US" dirty="0" smtClean="0"/>
+              <a:t>只覆盖了一二级城市，达人可以来接送，一站式搞定</a:t>
+            </a:r>
+            <a:endParaRPr lang="en-US" altLang="zh-CN" dirty="0" smtClean="0"/>
+          </a:p>
+          <a:p>
+            <a:pPr lvl="1"/>
+            <a:r>
+              <a:rPr lang="zh-CN" altLang="en-US" dirty="0" smtClean="0"/>
+              <a:t>即时游客喜欢享受驾驶的乐趣，但是本地的部分道路，部分只有熟悉本地情况的司机才能胜任</a:t>
+            </a:r>
+            <a:endParaRPr lang="en-US" altLang="zh-CN" dirty="0" smtClean="0"/>
+          </a:p>
+          <a:p>
+            <a:r>
+              <a:rPr lang="zh-CN" altLang="en-US" dirty="0" smtClean="0"/>
+              <a:t>住</a:t>
+            </a:r>
+            <a:endParaRPr lang="en-US" altLang="zh-CN" dirty="0" smtClean="0"/>
+          </a:p>
+          <a:p>
+            <a:pPr lvl="1"/>
+            <a:r>
+              <a:rPr lang="zh-CN" altLang="en-US" dirty="0" smtClean="0"/>
+              <a:t>酒店已经扁平化，但是在线预订无法满足个性化的需求，例如为节省时间提前开房，但是前一批游客经常还未退房；加床、</a:t>
+            </a:r>
+            <a:r>
+              <a:rPr lang="en-US" altLang="zh-CN" dirty="0" smtClean="0"/>
+              <a:t>View</a:t>
+            </a:r>
+            <a:r>
+              <a:rPr lang="zh-CN" altLang="en-US" dirty="0" smtClean="0"/>
+              <a:t>、无烟层、</a:t>
+            </a:r>
+            <a:r>
+              <a:rPr lang="en-US" altLang="zh-CN" dirty="0" smtClean="0"/>
+              <a:t>King-size</a:t>
+            </a:r>
+            <a:r>
+              <a:rPr lang="zh-CN" altLang="en-US" dirty="0" smtClean="0"/>
+              <a:t>，还有一些非常特殊的订房需求，达人可以提前预先帮你搞定</a:t>
+            </a:r>
+            <a:endParaRPr lang="en-US" altLang="zh-CN" dirty="0" smtClean="0"/>
+          </a:p>
+          <a:p>
+            <a:r>
+              <a:rPr lang="zh-CN" altLang="en-US" dirty="0" smtClean="0"/>
+              <a:t>玩</a:t>
+            </a:r>
+            <a:endParaRPr lang="en-US" altLang="zh-CN" dirty="0" smtClean="0"/>
+          </a:p>
+          <a:p>
+            <a:pPr lvl="1"/>
+            <a:r>
+              <a:rPr lang="en-US" altLang="zh-CN" dirty="0" smtClean="0"/>
+              <a:t>4A</a:t>
+            </a:r>
+            <a:r>
+              <a:rPr lang="zh-CN" altLang="en-US" dirty="0" smtClean="0"/>
+              <a:t>、</a:t>
+            </a:r>
+            <a:r>
+              <a:rPr lang="en-US" altLang="zh-CN" dirty="0" smtClean="0"/>
+              <a:t>5A</a:t>
+            </a:r>
+            <a:r>
+              <a:rPr lang="zh-CN" altLang="en-US" dirty="0" smtClean="0"/>
+              <a:t>只是有些财团包装了一下的景点而已，资深游客才知道，其实更多的好玩的地方在民间，达人可以带你去，跟你说说那些地方老八辈的故事和传说</a:t>
+            </a:r>
+            <a:endParaRPr lang="en-US" altLang="zh-CN" dirty="0" smtClean="0"/>
+          </a:p>
+          <a:p>
+            <a:r>
+              <a:rPr lang="zh-CN" altLang="en-US" dirty="0" smtClean="0"/>
+              <a:t>特产</a:t>
+            </a:r>
+            <a:endParaRPr lang="en-US" altLang="zh-CN" dirty="0" smtClean="0"/>
+          </a:p>
+          <a:p>
+            <a:pPr lvl="1"/>
+            <a:r>
+              <a:rPr lang="zh-CN" altLang="en-US" dirty="0" smtClean="0"/>
+              <a:t>那些从当地卖到你居住的城市的东西真的就是特产吗？一些好东西你不去当地是看不到的。例如问政山的笋，比安吉的更白更嫩；歙县的新鲜甘蔗口感比广东和湖南的要好；遂昌有种食品叫黄米果你知道怎么做的吗？</a:t>
+            </a:r>
+            <a:endParaRPr lang="en-US" altLang="zh-CN" dirty="0" smtClean="0"/>
+          </a:p>
+          <a:p>
+            <a:r>
+              <a:rPr lang="zh-CN" altLang="en-US" dirty="0"/>
+              <a:t>陪</a:t>
+            </a:r>
+            <a:r>
+              <a:rPr lang="zh-CN" altLang="en-US" dirty="0" smtClean="0"/>
+              <a:t>游</a:t>
+            </a:r>
+            <a:endParaRPr lang="en-US" altLang="zh-CN" dirty="0" smtClean="0"/>
+          </a:p>
+          <a:p>
+            <a:pPr lvl="1"/>
+            <a:r>
+              <a:rPr lang="zh-CN" altLang="en-US" dirty="0" smtClean="0"/>
+              <a:t>体验当地人的文化，吃当地人的食物，体验当地人的生活</a:t>
+            </a:r>
+            <a:endParaRPr lang="en-US" altLang="zh-CN" dirty="0" smtClean="0"/>
+          </a:p>
+          <a:p>
+            <a:pPr marL="0" indent="0" algn="ctr">
+              <a:buNone/>
+            </a:pPr>
+            <a:r>
+              <a:rPr lang="zh-CN" altLang="en-US" sz="3800" b="1" dirty="0">
+                <a:solidFill>
+                  <a:srgbClr val="FF0000"/>
+                </a:solidFill>
+              </a:rPr>
+              <a:t>这</a:t>
+            </a:r>
+            <a:r>
+              <a:rPr lang="zh-CN" altLang="en-US" sz="3800" b="1" dirty="0" smtClean="0">
+                <a:solidFill>
+                  <a:srgbClr val="FF0000"/>
+                </a:solidFill>
+              </a:rPr>
+              <a:t>才是像当地人一样生活</a:t>
+            </a:r>
+            <a:endParaRPr lang="en-US" altLang="zh-CN" sz="3800" b="1" dirty="0" smtClean="0">
+              <a:solidFill>
+                <a:srgbClr val="FF0000"/>
+              </a:solidFill>
+            </a:endParaRPr>
+          </a:p>
+          <a:p>
+            <a:pPr lvl="1"/>
             <a:endParaRPr lang="zh-CN" altLang="en-US" dirty="0"/>
           </a:p>
         </p:txBody>
@@ -4110,7 +4213,7 @@
     </p:spTree>
     <p:extLst>
       <p:ext uri="{BB962C8B-B14F-4D97-AF65-F5344CB8AC3E}">
-        <p14:creationId xmlns:p14="http://schemas.microsoft.com/office/powerpoint/2010/main" val="3653845960"/>
+        <p14:creationId xmlns:p14="http://schemas.microsoft.com/office/powerpoint/2010/main" val="3136019531"/>
       </p:ext>
     </p:extLst>
   </p:cSld>
@@ -4149,12 +4252,14 @@
         </p:nvSpPr>
         <p:spPr/>
         <p:txBody>
-          <a:bodyPr/>
-          <a:lstStyle/>
-          <a:p>
-            <a:r>
-              <a:rPr lang="zh-CN" altLang="en-US" dirty="0" smtClean="0"/>
-              <a:t>达人</a:t>
+          <a:bodyPr>
+            <a:normAutofit/>
+          </a:bodyPr>
+          <a:lstStyle/>
+          <a:p>
+            <a:r>
+              <a:rPr lang="zh-CN" altLang="en-US" dirty="0" smtClean="0"/>
+              <a:t>旅行车</a:t>
             </a:r>
             <a:endParaRPr lang="zh-CN" altLang="en-US" dirty="0"/>
           </a:p>
@@ -4172,127 +4277,28 @@
         </p:nvSpPr>
         <p:spPr/>
         <p:txBody>
-          <a:bodyPr>
-            <a:normAutofit fontScale="92500" lnSpcReduction="20000"/>
-          </a:bodyPr>
-          <a:lstStyle/>
-          <a:p>
-            <a:r>
-              <a:rPr lang="zh-CN" altLang="en-US" dirty="0" smtClean="0"/>
-              <a:t>达人圈</a:t>
-            </a:r>
-            <a:endParaRPr lang="en-US" altLang="zh-CN" dirty="0" smtClean="0"/>
-          </a:p>
-          <a:p>
-            <a:pPr lvl="1"/>
-            <a:r>
-              <a:rPr lang="zh-CN" altLang="en-US" dirty="0" smtClean="0"/>
-              <a:t>用户的行程可能未必一个达人就能搞定，需要达人之间互相帮助，或者多个达人为他量身定做</a:t>
-            </a:r>
-            <a:endParaRPr lang="en-US" altLang="zh-CN" dirty="0" smtClean="0"/>
-          </a:p>
-          <a:p>
-            <a:pPr lvl="1"/>
-            <a:r>
-              <a:rPr lang="zh-CN" altLang="en-US" dirty="0" smtClean="0"/>
-              <a:t>主</a:t>
-            </a:r>
-            <a:r>
-              <a:rPr lang="zh-CN" altLang="en-US" dirty="0"/>
-              <a:t>达人</a:t>
-            </a:r>
-            <a:r>
-              <a:rPr lang="zh-CN" altLang="en-US" dirty="0" smtClean="0"/>
-              <a:t>和子达人</a:t>
-            </a:r>
-            <a:endParaRPr lang="en-US" altLang="zh-CN" dirty="0" smtClean="0"/>
-          </a:p>
-          <a:p>
-            <a:r>
-              <a:rPr lang="zh-CN" altLang="en-US" dirty="0" smtClean="0"/>
-              <a:t>服务制定</a:t>
-            </a:r>
-            <a:r>
-              <a:rPr lang="en-US" altLang="zh-CN" dirty="0" smtClean="0"/>
-              <a:t>-》</a:t>
-            </a:r>
-            <a:r>
-              <a:rPr lang="zh-CN" altLang="en-US" dirty="0" smtClean="0"/>
-              <a:t>接单</a:t>
-            </a:r>
-            <a:r>
-              <a:rPr lang="en-US" altLang="zh-CN" dirty="0" smtClean="0"/>
-              <a:t>-》</a:t>
-            </a:r>
-            <a:r>
-              <a:rPr lang="zh-CN" altLang="en-US" dirty="0" smtClean="0"/>
-              <a:t>服务过程</a:t>
-            </a:r>
-            <a:r>
-              <a:rPr lang="en-US" altLang="zh-CN" dirty="0" smtClean="0"/>
-              <a:t>-》</a:t>
-            </a:r>
-            <a:r>
-              <a:rPr lang="zh-CN" altLang="en-US" dirty="0" smtClean="0"/>
-              <a:t>服务结束</a:t>
-            </a:r>
-            <a:r>
-              <a:rPr lang="en-US" altLang="zh-CN" dirty="0" smtClean="0"/>
-              <a:t>-》</a:t>
-            </a:r>
-            <a:r>
-              <a:rPr lang="zh-CN" altLang="en-US" dirty="0" smtClean="0"/>
-              <a:t>评价</a:t>
-            </a:r>
-            <a:endParaRPr lang="en-US" altLang="zh-CN" dirty="0" smtClean="0"/>
-          </a:p>
-          <a:p>
-            <a:r>
-              <a:rPr lang="zh-CN" altLang="en-US" dirty="0"/>
-              <a:t>达</a:t>
-            </a:r>
-            <a:r>
-              <a:rPr lang="zh-CN" altLang="en-US" dirty="0" smtClean="0"/>
-              <a:t>人提供的服务可以是千变万化的，可以是衣食住行的其中一类，可以是全程陪同</a:t>
-            </a:r>
-            <a:endParaRPr lang="en-US" altLang="zh-CN" dirty="0" smtClean="0"/>
-          </a:p>
-          <a:p>
-            <a:r>
-              <a:rPr lang="zh-CN" altLang="en-US" dirty="0" smtClean="0"/>
-              <a:t>明码标价，各取所需</a:t>
-            </a:r>
-            <a:endParaRPr lang="en-US" altLang="zh-CN" dirty="0" smtClean="0"/>
-          </a:p>
-          <a:p>
-            <a:r>
-              <a:rPr lang="zh-CN" altLang="en-US" dirty="0"/>
-              <a:t>达</a:t>
-            </a:r>
-            <a:r>
-              <a:rPr lang="zh-CN" altLang="en-US" dirty="0" smtClean="0"/>
-              <a:t>人可以打上不同的标签：</a:t>
-            </a:r>
-            <a:endParaRPr lang="en-US" altLang="zh-CN" dirty="0" smtClean="0"/>
-          </a:p>
-          <a:p>
-            <a:pPr lvl="1"/>
-            <a:r>
-              <a:rPr lang="zh-CN" altLang="en-US" dirty="0"/>
-              <a:t>历史达</a:t>
-            </a:r>
-            <a:r>
-              <a:rPr lang="zh-CN" altLang="en-US" dirty="0" smtClean="0"/>
-              <a:t>人、美女达人、当地大叔、逗孩子乐</a:t>
-            </a:r>
-            <a:endParaRPr lang="en-US" altLang="zh-CN" dirty="0" smtClean="0"/>
+          <a:bodyPr/>
+          <a:lstStyle/>
+          <a:p>
+            <a:r>
+              <a:rPr lang="zh-CN" altLang="en-US" dirty="0" smtClean="0"/>
+              <a:t>游客出行一般是先确定一个目的地，通过丰富的内容吸引用户，让用户选择想玩的地方</a:t>
+            </a:r>
+            <a:endParaRPr lang="en-US" altLang="zh-CN" dirty="0" smtClean="0"/>
+          </a:p>
+          <a:p>
+            <a:r>
+              <a:rPr lang="zh-CN" altLang="en-US" dirty="0" smtClean="0"/>
+              <a:t>游客可以把浏览过程中感兴趣的玩点、达人、服务标注“想玩”，或者直接加入旅行车，用户点击行程开始后，自动进行智能行程匹配、服务预定</a:t>
+            </a:r>
+            <a:endParaRPr lang="zh-CN" altLang="en-US" dirty="0"/>
           </a:p>
         </p:txBody>
       </p:sp>
     </p:spTree>
     <p:extLst>
       <p:ext uri="{BB962C8B-B14F-4D97-AF65-F5344CB8AC3E}">
-        <p14:creationId xmlns:p14="http://schemas.microsoft.com/office/powerpoint/2010/main" val="3560296070"/>
+        <p14:creationId xmlns:p14="http://schemas.microsoft.com/office/powerpoint/2010/main" val="3653845960"/>
       </p:ext>
     </p:extLst>
   </p:cSld>
@@ -4336,7 +4342,7 @@
           <a:p>
             <a:r>
               <a:rPr lang="zh-CN" altLang="en-US" dirty="0" smtClean="0"/>
-              <a:t>商业模式</a:t>
+              <a:t>达人</a:t>
             </a:r>
             <a:endParaRPr lang="zh-CN" altLang="en-US" dirty="0"/>
           </a:p>
@@ -4354,77 +4360,135 @@
         </p:nvSpPr>
         <p:spPr/>
         <p:txBody>
-          <a:bodyPr/>
-          <a:lstStyle/>
-          <a:p>
-            <a:r>
-              <a:rPr lang="zh-CN" altLang="en-US" dirty="0" smtClean="0"/>
-              <a:t>游客可以预定的服务包括：</a:t>
-            </a:r>
-            <a:endParaRPr lang="en-US" altLang="zh-CN" dirty="0" smtClean="0"/>
-          </a:p>
-          <a:p>
-            <a:pPr lvl="1"/>
+          <a:bodyPr>
+            <a:normAutofit fontScale="85000" lnSpcReduction="20000"/>
+          </a:bodyPr>
+          <a:lstStyle/>
+          <a:p>
+            <a:r>
+              <a:rPr lang="zh-CN" altLang="en-US" dirty="0" smtClean="0"/>
+              <a:t>达人圈</a:t>
+            </a:r>
+            <a:endParaRPr lang="en-US" altLang="zh-CN" dirty="0" smtClean="0"/>
+          </a:p>
+          <a:p>
+            <a:pPr lvl="1"/>
+            <a:r>
+              <a:rPr lang="zh-CN" altLang="en-US" dirty="0" smtClean="0"/>
+              <a:t>用户的行程可能未必一个达人就能搞定，需要达人之间互相帮助，或者多个达人为他量身定做</a:t>
+            </a:r>
+            <a:endParaRPr lang="en-US" altLang="zh-CN" dirty="0" smtClean="0"/>
+          </a:p>
+          <a:p>
+            <a:pPr lvl="1"/>
+            <a:r>
+              <a:rPr lang="zh-CN" altLang="en-US" dirty="0" smtClean="0"/>
+              <a:t>主</a:t>
+            </a:r>
             <a:r>
               <a:rPr lang="zh-CN" altLang="en-US" dirty="0"/>
-              <a:t>行程</a:t>
-            </a:r>
-            <a:r>
-              <a:rPr lang="zh-CN" altLang="en-US" dirty="0" smtClean="0"/>
-              <a:t>制定、代订、包车等简单服务</a:t>
-            </a:r>
-            <a:endParaRPr lang="en-US" altLang="zh-CN" dirty="0" smtClean="0"/>
-          </a:p>
-          <a:p>
-            <a:pPr lvl="1"/>
-            <a:r>
-              <a:rPr lang="zh-CN" altLang="en-US" dirty="0" smtClean="0"/>
-              <a:t>全程导游</a:t>
-            </a:r>
-            <a:endParaRPr lang="en-US" altLang="zh-CN" dirty="0" smtClean="0"/>
-          </a:p>
-          <a:p>
-            <a:r>
-              <a:rPr lang="zh-CN" altLang="en-US" dirty="0" smtClean="0"/>
-              <a:t>游</a:t>
-            </a:r>
-            <a:r>
-              <a:rPr lang="zh-CN" altLang="en-US" dirty="0" smtClean="0"/>
-              <a:t>徒预收费（预售一笔旅游基金，每日费用日日清）</a:t>
+              <a:t>达人</a:t>
+            </a:r>
+            <a:r>
+              <a:rPr lang="zh-CN" altLang="en-US" dirty="0" smtClean="0"/>
+              <a:t>和子达人</a:t>
+            </a:r>
+            <a:endParaRPr lang="en-US" altLang="zh-CN" dirty="0" smtClean="0"/>
+          </a:p>
+          <a:p>
+            <a:pPr lvl="1"/>
+            <a:r>
+              <a:rPr lang="zh-CN" altLang="en-US" dirty="0" smtClean="0"/>
+              <a:t>达人之间相互也是渠道</a:t>
+            </a:r>
+            <a:endParaRPr lang="en-US" altLang="zh-CN" dirty="0" smtClean="0"/>
+          </a:p>
+          <a:p>
+            <a:r>
+              <a:rPr lang="zh-CN" altLang="en-US" dirty="0" smtClean="0"/>
+              <a:t>服务制定</a:t>
+            </a:r>
+            <a:r>
+              <a:rPr lang="en-US" altLang="zh-CN" dirty="0" smtClean="0"/>
+              <a:t>-》</a:t>
+            </a:r>
+            <a:r>
+              <a:rPr lang="zh-CN" altLang="en-US" dirty="0" smtClean="0"/>
+              <a:t>接单</a:t>
+            </a:r>
+            <a:r>
+              <a:rPr lang="en-US" altLang="zh-CN" dirty="0" smtClean="0"/>
+              <a:t>-》</a:t>
+            </a:r>
+            <a:r>
+              <a:rPr lang="zh-CN" altLang="en-US" dirty="0" smtClean="0"/>
+              <a:t>服务过程</a:t>
+            </a:r>
+            <a:r>
+              <a:rPr lang="en-US" altLang="zh-CN" dirty="0" smtClean="0"/>
+              <a:t>-》</a:t>
+            </a:r>
+            <a:r>
+              <a:rPr lang="zh-CN" altLang="en-US" dirty="0" smtClean="0"/>
+              <a:t>服务结束</a:t>
+            </a:r>
+            <a:r>
+              <a:rPr lang="en-US" altLang="zh-CN" dirty="0" smtClean="0"/>
+              <a:t>-》</a:t>
+            </a:r>
+            <a:r>
+              <a:rPr lang="zh-CN" altLang="en-US" dirty="0" smtClean="0"/>
+              <a:t>评价</a:t>
             </a:r>
             <a:endParaRPr lang="en-US" altLang="zh-CN" dirty="0" smtClean="0"/>
           </a:p>
           <a:p>
             <a:r>
               <a:rPr lang="zh-CN" altLang="en-US" dirty="0"/>
-              <a:t>代</a:t>
-            </a:r>
-            <a:r>
-              <a:rPr lang="zh-CN" altLang="en-US" dirty="0" smtClean="0"/>
-              <a:t>收费，代为预订机票、酒店、饭店等</a:t>
-            </a:r>
-            <a:endParaRPr lang="en-US" altLang="zh-CN" dirty="0" smtClean="0"/>
-          </a:p>
-          <a:p>
-            <a:r>
-              <a:rPr lang="zh-CN" altLang="en-US" dirty="0" smtClean="0"/>
-              <a:t>旅游金融，提供短期旅游贷款</a:t>
-            </a:r>
-            <a:endParaRPr lang="en-US" altLang="zh-CN" dirty="0" smtClean="0"/>
-          </a:p>
-          <a:p>
-            <a:r>
-              <a:rPr lang="zh-CN" altLang="en-US" dirty="0" smtClean="0"/>
-              <a:t>游徒积分兑换</a:t>
-            </a:r>
-            <a:endParaRPr lang="zh-CN" altLang="en-US" dirty="0"/>
+              <a:t>达</a:t>
+            </a:r>
+            <a:r>
+              <a:rPr lang="zh-CN" altLang="en-US" dirty="0" smtClean="0"/>
+              <a:t>人提供的服务可以是千变万化的，可以是衣食住行的其中一类，可以是全程陪同，总的来说包括：吃、住、行、玩、购、陪</a:t>
+            </a:r>
+            <a:endParaRPr lang="en-US" altLang="zh-CN" dirty="0" smtClean="0"/>
+          </a:p>
+          <a:p>
+            <a:r>
+              <a:rPr lang="zh-CN" altLang="en-US" dirty="0" smtClean="0"/>
+              <a:t>明码标价，各取所需</a:t>
+            </a:r>
+            <a:endParaRPr lang="en-US" altLang="zh-CN" dirty="0" smtClean="0"/>
+          </a:p>
+          <a:p>
+            <a:r>
+              <a:rPr lang="zh-CN" altLang="en-US" dirty="0"/>
+              <a:t>达</a:t>
+            </a:r>
+            <a:r>
+              <a:rPr lang="zh-CN" altLang="en-US" dirty="0" smtClean="0"/>
+              <a:t>人可以打上不同的标签：</a:t>
+            </a:r>
+            <a:endParaRPr lang="en-US" altLang="zh-CN" dirty="0" smtClean="0"/>
+          </a:p>
+          <a:p>
+            <a:pPr lvl="1"/>
+            <a:r>
+              <a:rPr lang="zh-CN" altLang="en-US" dirty="0"/>
+              <a:t>历史达</a:t>
+            </a:r>
+            <a:r>
+              <a:rPr lang="zh-CN" altLang="en-US" dirty="0" smtClean="0"/>
+              <a:t>人、美女达人、当地大叔、逗孩子乐</a:t>
+            </a:r>
+            <a:endParaRPr lang="en-US" altLang="zh-CN" dirty="0" smtClean="0"/>
           </a:p>
         </p:txBody>
       </p:sp>
     </p:spTree>
     <p:extLst>
       <p:ext uri="{BB962C8B-B14F-4D97-AF65-F5344CB8AC3E}">
-        <p14:creationId xmlns:p14="http://schemas.microsoft.com/office/powerpoint/2010/main" val="1083630717"/>
+        <p14:creationId xmlns:p14="http://schemas.microsoft.com/office/powerpoint/2010/main" val="3560296070"/>
       </p:ext>
     </p:extLst>
   </p:cSld>
@@ -4468,7 +4532,7 @@
           <a:p>
             <a:r>
               <a:rPr lang="zh-CN" altLang="en-US" dirty="0" smtClean="0"/>
-              <a:t>我们的特点</a:t>
+              <a:t>商业模式</a:t>
             </a:r>
             <a:endParaRPr lang="zh-CN" altLang="en-US" dirty="0"/>
           </a:p>
@@ -4487,192 +4551,65 @@
         <p:spPr/>
         <p:txBody>
           <a:bodyPr>
-            <a:normAutofit fontScale="55000" lnSpcReduction="20000"/>
+            <a:normAutofit fontScale="92500" lnSpcReduction="20000"/>
           </a:bodyPr>
           <a:lstStyle/>
           <a:p>
             <a:r>
               <a:rPr lang="zh-CN" altLang="en-US" dirty="0" smtClean="0"/>
-              <a:t>景点</a:t>
-            </a:r>
-            <a:r>
-              <a:rPr lang="en-US" altLang="zh-CN" dirty="0" smtClean="0"/>
-              <a:t>-》</a:t>
-            </a:r>
-            <a:r>
-              <a:rPr lang="zh-CN" altLang="en-US" dirty="0" smtClean="0"/>
-              <a:t>玩点</a:t>
-            </a:r>
-            <a:endParaRPr lang="en-US" altLang="zh-CN" dirty="0" smtClean="0"/>
-          </a:p>
-          <a:p>
-            <a:pPr lvl="1"/>
+              <a:t>游客可以预定的服务包括：吃、住、行、玩、购、陪，按照整体打包、按天、按次等方式明码标价</a:t>
+            </a:r>
+            <a:endParaRPr lang="en-US" altLang="zh-CN" dirty="0"/>
+          </a:p>
+          <a:p>
+            <a:r>
+              <a:rPr lang="zh-CN" altLang="en-US" dirty="0" smtClean="0"/>
+              <a:t>游徒预收费（预售一笔旅游基金，每日费用日日清）</a:t>
+            </a:r>
+            <a:endParaRPr lang="en-US" altLang="zh-CN" dirty="0" smtClean="0"/>
+          </a:p>
+          <a:p>
             <a:r>
               <a:rPr lang="zh-CN" altLang="en-US" dirty="0"/>
-              <a:t>像</a:t>
-            </a:r>
-            <a:r>
-              <a:rPr lang="zh-CN" altLang="en-US" dirty="0" smtClean="0"/>
-              <a:t>当地人一样生活</a:t>
-            </a:r>
-            <a:endParaRPr lang="en-US" altLang="zh-CN" dirty="0" smtClean="0"/>
-          </a:p>
-          <a:p>
-            <a:pPr lvl="1"/>
-            <a:r>
-              <a:rPr lang="en-US" altLang="zh-CN" dirty="0" smtClean="0"/>
-              <a:t>5A</a:t>
-            </a:r>
-            <a:r>
-              <a:rPr lang="zh-CN" altLang="en-US" dirty="0" smtClean="0"/>
-              <a:t>、</a:t>
-            </a:r>
-            <a:r>
-              <a:rPr lang="en-US" altLang="zh-CN" dirty="0" smtClean="0"/>
-              <a:t>4A</a:t>
-            </a:r>
-            <a:r>
-              <a:rPr lang="zh-CN" altLang="en-US" dirty="0" smtClean="0"/>
-              <a:t>门票贵，要玩一些有参与感的活动</a:t>
-            </a:r>
-            <a:endParaRPr lang="en-US" altLang="zh-CN" dirty="0" smtClean="0"/>
-          </a:p>
-          <a:p>
-            <a:pPr lvl="1"/>
-            <a:r>
-              <a:rPr lang="zh-CN" altLang="en-US" dirty="0" smtClean="0"/>
-              <a:t>远离拥挤，爬野山，看祠堂，听故事</a:t>
-            </a:r>
-            <a:endParaRPr lang="en-US" altLang="zh-CN" dirty="0" smtClean="0"/>
-          </a:p>
-          <a:p>
-            <a:pPr lvl="1"/>
-            <a:r>
-              <a:rPr lang="zh-CN" altLang="en-US" dirty="0" smtClean="0"/>
-              <a:t>社戏、音乐节、庙会、赶集，体验原生态</a:t>
-            </a:r>
-            <a:endParaRPr lang="en-US" altLang="zh-CN" dirty="0" smtClean="0"/>
-          </a:p>
-          <a:p>
-            <a:pPr lvl="1"/>
+              <a:t>代</a:t>
+            </a:r>
+            <a:r>
+              <a:rPr lang="zh-CN" altLang="en-US" dirty="0" smtClean="0"/>
+              <a:t>收费，代为预订机票、酒店、饭店等</a:t>
+            </a:r>
+            <a:endParaRPr lang="en-US" altLang="zh-CN" dirty="0" smtClean="0"/>
+          </a:p>
+          <a:p>
+            <a:r>
+              <a:rPr lang="zh-CN" altLang="en-US" dirty="0" smtClean="0"/>
+              <a:t>旅游金融，提供短期旅游贷款</a:t>
+            </a:r>
+            <a:endParaRPr lang="en-US" altLang="zh-CN" dirty="0" smtClean="0"/>
+          </a:p>
+          <a:p>
             <a:r>
               <a:rPr lang="zh-CN" altLang="en-US" dirty="0"/>
-              <a:t>原始</a:t>
-            </a:r>
-            <a:r>
-              <a:rPr lang="zh-CN" altLang="en-US" dirty="0" smtClean="0"/>
-              <a:t>食材的获得和烹制，舌尖上的旅行</a:t>
-            </a:r>
-            <a:endParaRPr lang="en-US" altLang="zh-CN" dirty="0" smtClean="0"/>
-          </a:p>
-          <a:p>
-            <a:r>
-              <a:rPr lang="zh-CN" altLang="en-US" dirty="0" smtClean="0"/>
-              <a:t>贴身的服务</a:t>
-            </a:r>
-            <a:endParaRPr lang="en-US" altLang="zh-CN" dirty="0" smtClean="0"/>
-          </a:p>
-          <a:p>
-            <a:pPr lvl="1"/>
-            <a:r>
-              <a:rPr lang="zh-CN" altLang="en-US" dirty="0" smtClean="0"/>
-              <a:t>可选服务内容，加入购物车，一站式搞定</a:t>
-            </a:r>
-            <a:endParaRPr lang="en-US" altLang="zh-CN" dirty="0" smtClean="0"/>
-          </a:p>
-          <a:p>
-            <a:pPr lvl="1"/>
-            <a:r>
-              <a:rPr lang="zh-CN" altLang="en-US" dirty="0" smtClean="0"/>
-              <a:t>互相评分，让无德游客和服务不好的达人无所遁形</a:t>
-            </a:r>
-            <a:endParaRPr lang="en-US" altLang="zh-CN" dirty="0" smtClean="0"/>
-          </a:p>
-          <a:p>
-            <a:pPr lvl="1"/>
-            <a:r>
-              <a:rPr lang="zh-CN" altLang="en-US" dirty="0" smtClean="0"/>
-              <a:t>行程定制</a:t>
-            </a:r>
-            <a:endParaRPr lang="en-US" altLang="zh-CN" dirty="0" smtClean="0"/>
-          </a:p>
-          <a:p>
-            <a:pPr lvl="1"/>
-            <a:r>
-              <a:rPr lang="zh-CN" altLang="en-US" dirty="0" smtClean="0"/>
-              <a:t>费用透明</a:t>
-            </a:r>
-            <a:endParaRPr lang="en-US" altLang="zh-CN" dirty="0" smtClean="0"/>
-          </a:p>
-          <a:p>
-            <a:pPr lvl="1"/>
-            <a:r>
-              <a:rPr lang="zh-CN" altLang="en-US" dirty="0" smtClean="0"/>
-              <a:t>全程陪游</a:t>
-            </a:r>
-            <a:endParaRPr lang="en-US" altLang="zh-CN" dirty="0" smtClean="0"/>
-          </a:p>
-          <a:p>
-            <a:pPr lvl="1"/>
-            <a:r>
-              <a:rPr lang="zh-CN" altLang="en-US" dirty="0"/>
-              <a:t>最重要的</a:t>
-            </a:r>
-            <a:r>
-              <a:rPr lang="zh-CN" altLang="en-US" dirty="0" smtClean="0"/>
-              <a:t>是一种面对面的人文关怀，让游客像当地人一样生活</a:t>
-            </a:r>
-            <a:endParaRPr lang="en-US" altLang="zh-CN" dirty="0" smtClean="0"/>
-          </a:p>
-          <a:p>
-            <a:pPr marL="514350" indent="-457200"/>
-            <a:r>
-              <a:rPr lang="zh-CN" altLang="en-US" dirty="0"/>
-              <a:t>游</a:t>
-            </a:r>
-            <a:r>
-              <a:rPr lang="zh-CN" altLang="en-US" dirty="0" smtClean="0"/>
-              <a:t>徒社区</a:t>
-            </a:r>
-            <a:endParaRPr lang="en-US" altLang="zh-CN" dirty="0" smtClean="0"/>
-          </a:p>
-          <a:p>
-            <a:pPr marL="914400" lvl="1" indent="-457200"/>
-            <a:r>
-              <a:rPr lang="zh-CN" altLang="en-US" dirty="0"/>
-              <a:t>各类</a:t>
-            </a:r>
-            <a:r>
-              <a:rPr lang="zh-CN" altLang="en-US" dirty="0" smtClean="0"/>
-              <a:t>问题的沟通，可以勘误，有参与感</a:t>
-            </a:r>
-            <a:endParaRPr lang="en-US" altLang="zh-CN" dirty="0" smtClean="0"/>
-          </a:p>
-          <a:p>
-            <a:pPr marL="914400" lvl="1" indent="-457200"/>
-            <a:r>
-              <a:rPr lang="zh-CN" altLang="en-US" dirty="0" smtClean="0"/>
-              <a:t>足迹、晒一晒，带你装逼带你玩</a:t>
-            </a:r>
-            <a:endParaRPr lang="en-US" altLang="zh-CN" dirty="0" smtClean="0"/>
-          </a:p>
-          <a:p>
-            <a:pPr marL="914400" lvl="1" indent="-457200"/>
-            <a:r>
-              <a:rPr lang="zh-CN" altLang="en-US" dirty="0"/>
-              <a:t>达人圈，扩展自己的</a:t>
-            </a:r>
-            <a:r>
-              <a:rPr lang="zh-CN" altLang="en-US" dirty="0" smtClean="0"/>
-              <a:t>旅游资源</a:t>
-            </a:r>
+              <a:t>达人</a:t>
+            </a:r>
+            <a:r>
+              <a:rPr lang="zh-CN" altLang="en-US" dirty="0" smtClean="0"/>
+              <a:t>的服务费佣金先收入平台，再根据服务等级和评价发放给达人，和事后的打赏</a:t>
+            </a:r>
+            <a:endParaRPr lang="en-US" altLang="zh-CN" dirty="0" smtClean="0"/>
+          </a:p>
+          <a:p>
+            <a:r>
+              <a:rPr lang="zh-CN" altLang="en-US" dirty="0" smtClean="0"/>
+              <a:t>景点推广的广告效应</a:t>
+            </a:r>
+            <a:endParaRPr lang="zh-CN" altLang="en-US" dirty="0"/>
           </a:p>
         </p:txBody>
       </p:sp>
     </p:spTree>
     <p:extLst>
       <p:ext uri="{BB962C8B-B14F-4D97-AF65-F5344CB8AC3E}">
-        <p14:creationId xmlns:p14="http://schemas.microsoft.com/office/powerpoint/2010/main" val="2419744921"/>
+        <p14:creationId xmlns:p14="http://schemas.microsoft.com/office/powerpoint/2010/main" val="1083630717"/>
       </p:ext>
     </p:extLst>
   </p:cSld>
@@ -4716,7 +4653,7 @@
           <a:p>
             <a:r>
               <a:rPr lang="zh-CN" altLang="en-US" dirty="0" smtClean="0"/>
-              <a:t>我们的社会效应</a:t>
+              <a:t>我们的特点</a:t>
             </a:r>
             <a:endParaRPr lang="zh-CN" altLang="en-US" dirty="0"/>
           </a:p>
@@ -4732,55 +4669,212 @@
             <p:ph idx="1"/>
           </p:nvPr>
         </p:nvSpPr>
-        <p:spPr/>
+        <p:spPr>
+          <a:xfrm>
+            <a:off x="457200" y="1556792"/>
+            <a:ext cx="8229600" cy="4525963"/>
+          </a:xfrm>
+        </p:spPr>
         <p:txBody>
           <a:bodyPr>
-            <a:normAutofit fontScale="92500" lnSpcReduction="20000"/>
+            <a:normAutofit fontScale="55000" lnSpcReduction="20000"/>
           </a:bodyPr>
           <a:lstStyle/>
           <a:p>
             <a:r>
               <a:rPr lang="zh-CN" altLang="en-US" dirty="0" smtClean="0"/>
-              <a:t>中国五千年的历史，但是旅游相关产业在</a:t>
+              <a:t>景点</a:t>
             </a:r>
             <a:r>
               <a:rPr lang="en-US" altLang="zh-CN" dirty="0" smtClean="0"/>
-              <a:t>GDP</a:t>
-            </a:r>
-            <a:r>
-              <a:rPr lang="zh-CN" altLang="en-US" dirty="0" smtClean="0"/>
-              <a:t>中的比例还不如埃及，旅游从一定的程度上是一种文化的推介，我们希望通过平台把中国悠久的文化让大众所知道</a:t>
-            </a:r>
-            <a:endParaRPr lang="en-US" altLang="zh-CN" dirty="0" smtClean="0"/>
-          </a:p>
-          <a:p>
-            <a:r>
-              <a:rPr lang="zh-CN" altLang="en-US" dirty="0" smtClean="0"/>
-              <a:t>目的地的推介，需要达人的言传口授，玩的是情操，达人能把文化、饮食等各元素串在一起，进行综合的推广，特色推介，让当地的文化得到充分的体现</a:t>
-            </a:r>
-            <a:endParaRPr lang="en-US" altLang="zh-CN" dirty="0" smtClean="0"/>
-          </a:p>
-          <a:p>
-            <a:r>
-              <a:rPr lang="zh-CN" altLang="en-US" dirty="0" smtClean="0"/>
-              <a:t>我们为达人创造了一个就业的机会，为达人和游客之间创造一个磋商的平台，我们是旅游界的</a:t>
-            </a:r>
+              <a:t>-》</a:t>
+            </a:r>
+            <a:r>
+              <a:rPr lang="zh-CN" altLang="en-US" dirty="0" smtClean="0"/>
+              <a:t>玩点</a:t>
+            </a:r>
+            <a:endParaRPr lang="en-US" altLang="zh-CN" dirty="0" smtClean="0"/>
+          </a:p>
+          <a:p>
+            <a:pPr lvl="1"/>
+            <a:r>
+              <a:rPr lang="zh-CN" altLang="en-US" dirty="0"/>
+              <a:t>像</a:t>
+            </a:r>
+            <a:r>
+              <a:rPr lang="zh-CN" altLang="en-US" dirty="0" smtClean="0"/>
+              <a:t>当地人一样生活</a:t>
+            </a:r>
+            <a:endParaRPr lang="en-US" altLang="zh-CN" dirty="0" smtClean="0"/>
+          </a:p>
+          <a:p>
+            <a:pPr lvl="1"/>
             <a:r>
               <a:rPr lang="en-US" altLang="zh-CN" dirty="0" smtClean="0"/>
-              <a:t>UBER</a:t>
-            </a:r>
-            <a:r>
-              <a:rPr lang="zh-CN" altLang="en-US" dirty="0" smtClean="0"/>
-              <a:t>。</a:t>
-            </a:r>
-            <a:endParaRPr lang="en-US" altLang="zh-CN" dirty="0" smtClean="0"/>
+              <a:t>5A</a:t>
+            </a:r>
+            <a:r>
+              <a:rPr lang="zh-CN" altLang="en-US" dirty="0" smtClean="0"/>
+              <a:t>、</a:t>
+            </a:r>
+            <a:r>
+              <a:rPr lang="en-US" altLang="zh-CN" dirty="0" smtClean="0"/>
+              <a:t>4A</a:t>
+            </a:r>
+            <a:r>
+              <a:rPr lang="zh-CN" altLang="en-US" dirty="0" smtClean="0"/>
+              <a:t>门票贵，要玩一些有参与感的活动</a:t>
+            </a:r>
+            <a:endParaRPr lang="en-US" altLang="zh-CN" dirty="0" smtClean="0"/>
+          </a:p>
+          <a:p>
+            <a:pPr lvl="1"/>
+            <a:r>
+              <a:rPr lang="zh-CN" altLang="en-US" dirty="0" smtClean="0"/>
+              <a:t>远离拥挤，爬野山，看祠堂，听故事</a:t>
+            </a:r>
+            <a:endParaRPr lang="en-US" altLang="zh-CN" dirty="0" smtClean="0"/>
+          </a:p>
+          <a:p>
+            <a:pPr lvl="1"/>
+            <a:r>
+              <a:rPr lang="zh-CN" altLang="en-US" dirty="0" smtClean="0"/>
+              <a:t>社戏、音乐节、庙会、赶集，体验原生态</a:t>
+            </a:r>
+            <a:endParaRPr lang="en-US" altLang="zh-CN" dirty="0" smtClean="0"/>
+          </a:p>
+          <a:p>
+            <a:pPr lvl="1"/>
+            <a:r>
+              <a:rPr lang="zh-CN" altLang="en-US" dirty="0"/>
+              <a:t>原始</a:t>
+            </a:r>
+            <a:r>
+              <a:rPr lang="zh-CN" altLang="en-US" dirty="0" smtClean="0"/>
+              <a:t>食材的获得和烹制，舌尖上的旅行</a:t>
+            </a:r>
+            <a:endParaRPr lang="en-US" altLang="zh-CN" dirty="0" smtClean="0"/>
+          </a:p>
+          <a:p>
+            <a:r>
+              <a:rPr lang="zh-CN" altLang="en-US" dirty="0" smtClean="0"/>
+              <a:t>贴身的服务</a:t>
+            </a:r>
+            <a:endParaRPr lang="en-US" altLang="zh-CN" dirty="0" smtClean="0"/>
+          </a:p>
+          <a:p>
+            <a:pPr lvl="1"/>
+            <a:r>
+              <a:rPr lang="zh-CN" altLang="en-US" dirty="0" smtClean="0"/>
+              <a:t>可选服务内容，加入购物车，一站式搞定</a:t>
+            </a:r>
+            <a:endParaRPr lang="en-US" altLang="zh-CN" dirty="0" smtClean="0"/>
+          </a:p>
+          <a:p>
+            <a:pPr lvl="1"/>
+            <a:r>
+              <a:rPr lang="zh-CN" altLang="en-US" dirty="0" smtClean="0"/>
+              <a:t>互相评分，让无德游客和服务不好的达人无所遁形</a:t>
+            </a:r>
+            <a:endParaRPr lang="en-US" altLang="zh-CN" dirty="0" smtClean="0"/>
+          </a:p>
+          <a:p>
+            <a:pPr lvl="1"/>
+            <a:r>
+              <a:rPr lang="zh-CN" altLang="en-US" dirty="0" smtClean="0"/>
+              <a:t>行程定制</a:t>
+            </a:r>
+            <a:endParaRPr lang="en-US" altLang="zh-CN" dirty="0" smtClean="0"/>
+          </a:p>
+          <a:p>
+            <a:pPr lvl="1"/>
+            <a:r>
+              <a:rPr lang="zh-CN" altLang="en-US" dirty="0" smtClean="0"/>
+              <a:t>费用透明</a:t>
+            </a:r>
+            <a:endParaRPr lang="en-US" altLang="zh-CN" dirty="0" smtClean="0"/>
+          </a:p>
+          <a:p>
+            <a:pPr lvl="1"/>
+            <a:r>
+              <a:rPr lang="zh-CN" altLang="en-US" dirty="0" smtClean="0"/>
+              <a:t>全程陪游</a:t>
+            </a:r>
+            <a:endParaRPr lang="en-US" altLang="zh-CN" dirty="0" smtClean="0"/>
+          </a:p>
+          <a:p>
+            <a:pPr lvl="1"/>
+            <a:r>
+              <a:rPr lang="zh-CN" altLang="en-US" dirty="0"/>
+              <a:t>最重要的</a:t>
+            </a:r>
+            <a:r>
+              <a:rPr lang="zh-CN" altLang="en-US" dirty="0" smtClean="0"/>
+              <a:t>是一种面对面的人文关怀，让游客像当地人一样生活</a:t>
+            </a:r>
+            <a:endParaRPr lang="en-US" altLang="zh-CN" dirty="0" smtClean="0"/>
+          </a:p>
+          <a:p>
+            <a:pPr marL="514350" indent="-457200"/>
+            <a:r>
+              <a:rPr lang="zh-CN" altLang="en-US" dirty="0"/>
+              <a:t>游</a:t>
+            </a:r>
+            <a:r>
+              <a:rPr lang="zh-CN" altLang="en-US" dirty="0" smtClean="0"/>
+              <a:t>徒社区</a:t>
+            </a:r>
+            <a:endParaRPr lang="en-US" altLang="zh-CN" dirty="0" smtClean="0"/>
+          </a:p>
+          <a:p>
+            <a:pPr marL="914400" lvl="1" indent="-457200"/>
+            <a:r>
+              <a:rPr lang="zh-CN" altLang="en-US" dirty="0" smtClean="0"/>
+              <a:t>收藏、点评、分享、想玩、私信、聊天</a:t>
+            </a:r>
+            <a:endParaRPr lang="en-US" altLang="zh-CN" dirty="0" smtClean="0"/>
+          </a:p>
+          <a:p>
+            <a:pPr marL="914400" lvl="1" indent="-457200"/>
+            <a:r>
+              <a:rPr lang="zh-CN" altLang="en-US" dirty="0" smtClean="0"/>
+              <a:t>各</a:t>
+            </a:r>
+            <a:r>
+              <a:rPr lang="zh-CN" altLang="en-US" dirty="0"/>
+              <a:t>类</a:t>
+            </a:r>
+            <a:r>
+              <a:rPr lang="zh-CN" altLang="en-US" dirty="0" smtClean="0"/>
+              <a:t>问题的沟通，可以勘误，有参与感</a:t>
+            </a:r>
+            <a:endParaRPr lang="en-US" altLang="zh-CN" dirty="0" smtClean="0"/>
+          </a:p>
+          <a:p>
+            <a:pPr marL="914400" lvl="1" indent="-457200"/>
+            <a:r>
+              <a:rPr lang="zh-CN" altLang="en-US" dirty="0" smtClean="0"/>
+              <a:t>足迹、晒一晒，带你装逼带你玩</a:t>
+            </a:r>
+            <a:endParaRPr lang="en-US" altLang="zh-CN" dirty="0" smtClean="0"/>
+          </a:p>
+          <a:p>
+            <a:pPr marL="914400" lvl="1" indent="-457200"/>
+            <a:r>
+              <a:rPr lang="zh-CN" altLang="en-US" dirty="0"/>
+              <a:t>达人圈，扩展自己的</a:t>
+            </a:r>
+            <a:r>
+              <a:rPr lang="zh-CN" altLang="en-US" dirty="0" smtClean="0"/>
+              <a:t>旅游资源</a:t>
+            </a:r>
           </a:p>
         </p:txBody>
       </p:sp>
     </p:spTree>
     <p:extLst>
       <p:ext uri="{BB962C8B-B14F-4D97-AF65-F5344CB8AC3E}">
-        <p14:creationId xmlns:p14="http://schemas.microsoft.com/office/powerpoint/2010/main" val="4058753682"/>
+        <p14:creationId xmlns:p14="http://schemas.microsoft.com/office/powerpoint/2010/main" val="2419744921"/>
       </p:ext>
     </p:extLst>
   </p:cSld>
@@ -4843,10 +4937,11 @@
         <p:spPr/>
         <p:txBody>
           <a:bodyPr>
-            <a:normAutofit fontScale="92500" lnSpcReduction="20000"/>
+            <a:normAutofit lnSpcReduction="10000"/>
           </a:bodyPr>
           <a:lstStyle/>
           <a:p>
+            <a:pPr lvl="1"/>
             <a:r>
               <a:rPr lang="zh-CN" altLang="en-US" dirty="0" smtClean="0"/>
               <a:t>我们行进在旅游的途中，寻找自己内心深处那份不一样的东西，情感寄托的圣地。或许是文艺，或许是孤独，也许只是装逼。而我所追寻的是在陌生的地方的那种肆无忌惮！</a:t>
@@ -4854,6 +4949,7 @@
             <a:endParaRPr lang="en-US" altLang="zh-CN" dirty="0" smtClean="0"/>
           </a:p>
           <a:p>
+            <a:pPr lvl="1"/>
             <a:r>
               <a:rPr lang="zh-CN" altLang="en-US" dirty="0" smtClean="0"/>
               <a:t>在基督教的教义中，基督徒可以通过对圣地</a:t>
@@ -4869,6 +4965,7 @@
             <a:endParaRPr lang="en-US" altLang="zh-CN" dirty="0" smtClean="0"/>
           </a:p>
           <a:p>
+            <a:pPr lvl="1"/>
             <a:r>
               <a:rPr lang="zh-CN" altLang="en-US" dirty="0" smtClean="0"/>
               <a:t>旅游也是一种解脱，一种忏悔，将你从平日芸芸众生般的生活中解脱出来，忏悔你过去在世俗中所浪费的青春，追寻自我，找到你心中的圣地。</a:t>
@@ -4887,6 +4984,13 @@
   <p:clrMapOvr>
     <a:masterClrMapping/>
   </p:clrMapOvr>
+  <p:timing>
+    <p:tnLst>
+      <p:par>
+        <p:cTn id="1" dur="indefinite" restart="never" nodeType="tmRoot"/>
+      </p:par>
+    </p:tnLst>
+  </p:timing>
 </p:sld>
 </file>
 
@@ -4923,12 +5027,8 @@
           <a:lstStyle/>
           <a:p>
             <a:r>
-              <a:rPr lang="zh-CN" altLang="en-US" dirty="0"/>
-              <a:t>达人</a:t>
-            </a:r>
-            <a:r>
-              <a:rPr lang="zh-CN" altLang="en-US" dirty="0" smtClean="0"/>
-              <a:t>的来源</a:t>
+              <a:rPr lang="zh-CN" altLang="en-US" dirty="0" smtClean="0"/>
+              <a:t>我们的社会效应</a:t>
             </a:r>
             <a:endParaRPr lang="zh-CN" altLang="en-US" dirty="0"/>
           </a:p>
@@ -4953,89 +5053,46 @@
           <a:p>
             <a:r>
               <a:rPr lang="zh-CN" altLang="en-US" dirty="0" smtClean="0"/>
-              <a:t>一些收入低下的当地地陪导游，希望能提高自己的生活地位，也有一定的情怀</a:t>
-            </a:r>
-            <a:endParaRPr lang="en-US" altLang="zh-CN" dirty="0" smtClean="0"/>
-          </a:p>
-          <a:p>
-            <a:r>
-              <a:rPr lang="zh-CN" altLang="en-US" dirty="0"/>
-              <a:t>许多</a:t>
-            </a:r>
-            <a:r>
-              <a:rPr lang="zh-CN" altLang="en-US" dirty="0" smtClean="0"/>
-              <a:t>当地人都有一些资源，或者有许多亲戚，可以提供各种达人服务：</a:t>
-            </a:r>
-            <a:endParaRPr lang="en-US" altLang="zh-CN" dirty="0" smtClean="0"/>
-          </a:p>
-          <a:p>
-            <a:pPr lvl="1"/>
-            <a:r>
-              <a:rPr lang="zh-CN" altLang="en-US" dirty="0" smtClean="0"/>
-              <a:t>公务员、上班族周末带客</a:t>
-            </a:r>
-            <a:endParaRPr lang="en-US" altLang="zh-CN" dirty="0" smtClean="0"/>
-          </a:p>
-          <a:p>
-            <a:pPr lvl="1"/>
-            <a:r>
-              <a:rPr lang="zh-CN" altLang="en-US" dirty="0" smtClean="0"/>
-              <a:t>门票减免，景点解说</a:t>
-            </a:r>
-            <a:endParaRPr lang="en-US" altLang="zh-CN" dirty="0" smtClean="0"/>
-          </a:p>
-          <a:p>
-            <a:pPr lvl="1"/>
-            <a:r>
-              <a:rPr lang="zh-CN" altLang="en-US" dirty="0" smtClean="0"/>
-              <a:t>当地吃客玩家，欲把喜欢的东西当做职业</a:t>
-            </a:r>
-            <a:endParaRPr lang="en-US" altLang="zh-CN" dirty="0" smtClean="0"/>
-          </a:p>
-          <a:p>
-            <a:pPr lvl="1"/>
-            <a:r>
-              <a:rPr lang="zh-CN" altLang="en-US" dirty="0"/>
-              <a:t>农家</a:t>
-            </a:r>
-            <a:r>
-              <a:rPr lang="zh-CN" altLang="en-US" dirty="0" smtClean="0"/>
-              <a:t>乐老板，拓展业务</a:t>
-            </a:r>
-            <a:endParaRPr lang="en-US" altLang="zh-CN" dirty="0" smtClean="0"/>
-          </a:p>
-          <a:p>
-            <a:r>
-              <a:rPr lang="zh-CN" altLang="en-US" dirty="0" smtClean="0"/>
-              <a:t>特色</a:t>
-            </a:r>
-            <a:r>
-              <a:rPr lang="zh-CN" altLang="en-US" dirty="0"/>
-              <a:t>民俗</a:t>
-            </a:r>
-            <a:r>
-              <a:rPr lang="zh-CN" altLang="en-US" dirty="0" smtClean="0"/>
-              <a:t>村的村长，能说会道</a:t>
-            </a:r>
-            <a:endParaRPr lang="en-US" altLang="zh-CN" dirty="0" smtClean="0"/>
-          </a:p>
-          <a:p>
-            <a:r>
-              <a:rPr lang="zh-CN" altLang="en-US" dirty="0" smtClean="0"/>
-              <a:t>我们要做旅游界的</a:t>
+              <a:t>中国五千年的历史，但是旅游相关产业在</a:t>
+            </a:r>
+            <a:r>
+              <a:rPr lang="en-US" altLang="zh-CN" dirty="0" smtClean="0"/>
+              <a:t>GDP</a:t>
+            </a:r>
+            <a:r>
+              <a:rPr lang="zh-CN" altLang="en-US" dirty="0" smtClean="0"/>
+              <a:t>中的比例还不如埃及，旅游从一定的程度上是一种文化的推介，我们希望通过平台把中国悠久的文化让大众所知道</a:t>
+            </a:r>
+            <a:endParaRPr lang="en-US" altLang="zh-CN" dirty="0" smtClean="0"/>
+          </a:p>
+          <a:p>
+            <a:r>
+              <a:rPr lang="zh-CN" altLang="en-US" dirty="0" smtClean="0"/>
+              <a:t>目的地的推介，需要达人的言传口授，玩的是情操，达人能把文化、饮食等各元素串在一起，进行综合的推广，特色推介，让当地的文化得到充分的体现</a:t>
+            </a:r>
+            <a:endParaRPr lang="en-US" altLang="zh-CN" dirty="0" smtClean="0"/>
+          </a:p>
+          <a:p>
+            <a:r>
+              <a:rPr lang="zh-CN" altLang="en-US" dirty="0" smtClean="0"/>
+              <a:t>我们为达人创造了一个就业的机会，为达人和游客之间创造一个磋商的平台，我们是旅游界的</a:t>
             </a:r>
             <a:r>
               <a:rPr lang="en-US" altLang="zh-CN" dirty="0" smtClean="0"/>
               <a:t>UBER</a:t>
             </a:r>
-            <a:endParaRPr lang="zh-CN" altLang="en-US" dirty="0"/>
+            <a:r>
+              <a:rPr lang="zh-CN" altLang="en-US" dirty="0" smtClean="0"/>
+              <a:t>。</a:t>
+            </a:r>
+            <a:endParaRPr lang="en-US" altLang="zh-CN" dirty="0" smtClean="0"/>
           </a:p>
         </p:txBody>
       </p:sp>
     </p:spTree>
     <p:extLst>
       <p:ext uri="{BB962C8B-B14F-4D97-AF65-F5344CB8AC3E}">
-        <p14:creationId xmlns:p14="http://schemas.microsoft.com/office/powerpoint/2010/main" val="2882227733"/>
+        <p14:creationId xmlns:p14="http://schemas.microsoft.com/office/powerpoint/2010/main" val="4058753682"/>
       </p:ext>
     </p:extLst>
   </p:cSld>
@@ -5078,8 +5135,12 @@
           <a:lstStyle/>
           <a:p>
             <a:r>
-              <a:rPr lang="zh-CN" altLang="en-US" dirty="0" smtClean="0"/>
-              <a:t>客户定位</a:t>
+              <a:rPr lang="zh-CN" altLang="en-US" dirty="0"/>
+              <a:t>达人</a:t>
+            </a:r>
+            <a:r>
+              <a:rPr lang="zh-CN" altLang="en-US" dirty="0" smtClean="0"/>
+              <a:t>的来源</a:t>
             </a:r>
             <a:endParaRPr lang="zh-CN" altLang="en-US" dirty="0"/>
           </a:p>
@@ -5098,95 +5159,86 @@
         <p:spPr/>
         <p:txBody>
           <a:bodyPr>
-            <a:normAutofit fontScale="92500"/>
+            <a:normAutofit fontScale="92500" lnSpcReduction="20000"/>
           </a:bodyPr>
           <a:lstStyle/>
           <a:p>
             <a:r>
+              <a:rPr lang="zh-CN" altLang="en-US" dirty="0" smtClean="0"/>
+              <a:t>一些收入低下的当地地陪导游，希望能提高自己的生活地位，也有一定的情怀</a:t>
+            </a:r>
+            <a:endParaRPr lang="en-US" altLang="zh-CN" dirty="0" smtClean="0"/>
+          </a:p>
+          <a:p>
+            <a:r>
+              <a:rPr lang="zh-CN" altLang="en-US" dirty="0"/>
+              <a:t>许多</a:t>
+            </a:r>
+            <a:r>
+              <a:rPr lang="zh-CN" altLang="en-US" dirty="0" smtClean="0"/>
+              <a:t>当地人都有一些资源，或者有许多亲戚，可以提供各种达人服务：</a:t>
+            </a:r>
+            <a:endParaRPr lang="en-US" altLang="zh-CN" dirty="0" smtClean="0"/>
+          </a:p>
+          <a:p>
+            <a:pPr lvl="1"/>
+            <a:r>
+              <a:rPr lang="zh-CN" altLang="en-US" dirty="0" smtClean="0"/>
+              <a:t>公务员、上班族周末带客</a:t>
+            </a:r>
+            <a:endParaRPr lang="en-US" altLang="zh-CN" dirty="0" smtClean="0"/>
+          </a:p>
+          <a:p>
+            <a:pPr lvl="1"/>
+            <a:r>
+              <a:rPr lang="zh-CN" altLang="en-US" dirty="0" smtClean="0"/>
+              <a:t>门票减免，景点解说</a:t>
+            </a:r>
+            <a:endParaRPr lang="en-US" altLang="zh-CN" dirty="0" smtClean="0"/>
+          </a:p>
+          <a:p>
+            <a:pPr lvl="1"/>
+            <a:r>
+              <a:rPr lang="zh-CN" altLang="en-US" dirty="0" smtClean="0"/>
+              <a:t>当地吃客玩家，欲把喜欢的东西当做职业</a:t>
+            </a:r>
+            <a:endParaRPr lang="en-US" altLang="zh-CN" dirty="0" smtClean="0"/>
+          </a:p>
+          <a:p>
+            <a:pPr lvl="1"/>
+            <a:r>
+              <a:rPr lang="zh-CN" altLang="en-US" dirty="0"/>
+              <a:t>农家</a:t>
+            </a:r>
+            <a:r>
+              <a:rPr lang="zh-CN" altLang="en-US" dirty="0" smtClean="0"/>
+              <a:t>乐老板，拓展业务</a:t>
+            </a:r>
+            <a:endParaRPr lang="en-US" altLang="zh-CN" dirty="0" smtClean="0"/>
+          </a:p>
+          <a:p>
+            <a:r>
+              <a:rPr lang="zh-CN" altLang="en-US" dirty="0" smtClean="0"/>
+              <a:t>特色</a:t>
+            </a:r>
+            <a:r>
+              <a:rPr lang="zh-CN" altLang="en-US" dirty="0"/>
+              <a:t>民俗</a:t>
+            </a:r>
+            <a:r>
+              <a:rPr lang="zh-CN" altLang="en-US" dirty="0" smtClean="0"/>
+              <a:t>村的村长，能说会道</a:t>
+            </a:r>
+            <a:endParaRPr lang="en-US" altLang="zh-CN" dirty="0" smtClean="0"/>
+          </a:p>
+          <a:p>
+            <a:r>
+              <a:rPr lang="zh-CN" altLang="en-US" dirty="0" smtClean="0"/>
+              <a:t>我们要做旅游界的</a:t>
+            </a:r>
+            <a:r>
               <a:rPr lang="en-US" altLang="zh-CN" dirty="0" smtClean="0"/>
-              <a:t>30-45</a:t>
-            </a:r>
-            <a:r>
-              <a:rPr lang="zh-CN" altLang="en-US" dirty="0" smtClean="0"/>
-              <a:t>岁之间的中产阶级</a:t>
-            </a:r>
-            <a:endParaRPr lang="en-US" altLang="zh-CN" dirty="0" smtClean="0"/>
-          </a:p>
-          <a:p>
-            <a:pPr lvl="1"/>
-            <a:r>
-              <a:rPr lang="zh-CN" altLang="en-US" dirty="0"/>
-              <a:t>上有</a:t>
-            </a:r>
-            <a:r>
-              <a:rPr lang="zh-CN" altLang="en-US" dirty="0" smtClean="0"/>
-              <a:t>老，下有小，旅游需求旺盛</a:t>
-            </a:r>
-            <a:endParaRPr lang="en-US" altLang="zh-CN" dirty="0" smtClean="0"/>
-          </a:p>
-          <a:p>
-            <a:pPr lvl="1"/>
-            <a:r>
-              <a:rPr lang="zh-CN" altLang="en-US" dirty="0"/>
-              <a:t>有</a:t>
-            </a:r>
-            <a:r>
-              <a:rPr lang="zh-CN" altLang="en-US" dirty="0" smtClean="0"/>
-              <a:t>一定的经济基础，不会陷入比价的牛角尖</a:t>
-            </a:r>
-            <a:endParaRPr lang="en-US" altLang="zh-CN" dirty="0" smtClean="0"/>
-          </a:p>
-          <a:p>
-            <a:pPr lvl="1"/>
-            <a:r>
-              <a:rPr lang="zh-CN" altLang="en-US" dirty="0" smtClean="0"/>
-              <a:t>愿意为旅游服务买单</a:t>
-            </a:r>
-            <a:endParaRPr lang="en-US" altLang="zh-CN" dirty="0" smtClean="0"/>
-          </a:p>
-          <a:p>
-            <a:r>
-              <a:rPr lang="zh-CN" altLang="en-US" dirty="0" smtClean="0"/>
-              <a:t>公司团建</a:t>
-            </a:r>
-            <a:endParaRPr lang="en-US" altLang="zh-CN" dirty="0" smtClean="0"/>
-          </a:p>
-          <a:p>
-            <a:pPr lvl="1"/>
-            <a:r>
-              <a:rPr lang="zh-CN" altLang="en-US" dirty="0" smtClean="0"/>
-              <a:t>不一样的团队建设</a:t>
-            </a:r>
-            <a:endParaRPr lang="en-US" altLang="zh-CN" dirty="0" smtClean="0"/>
-          </a:p>
-          <a:p>
-            <a:pPr lvl="1"/>
-            <a:r>
-              <a:rPr lang="zh-CN" altLang="en-US" dirty="0"/>
-              <a:t>定制</a:t>
-            </a:r>
-            <a:r>
-              <a:rPr lang="zh-CN" altLang="en-US" dirty="0" smtClean="0"/>
-              <a:t>化的内容</a:t>
-            </a:r>
-            <a:endParaRPr lang="en-US" altLang="zh-CN" dirty="0" smtClean="0"/>
-          </a:p>
-          <a:p>
-            <a:pPr lvl="1"/>
-            <a:r>
-              <a:rPr lang="zh-CN" altLang="en-US" dirty="0" smtClean="0"/>
-              <a:t>凝聚力强</a:t>
-            </a:r>
-            <a:endParaRPr lang="en-US" altLang="zh-CN" dirty="0" smtClean="0"/>
-          </a:p>
-          <a:p>
-            <a:r>
-              <a:rPr lang="zh-CN" altLang="en-US" dirty="0"/>
-              <a:t>上午</a:t>
-            </a:r>
-            <a:r>
-              <a:rPr lang="zh-CN" altLang="en-US" dirty="0" smtClean="0"/>
-              <a:t>景点、下午体验，晚上开启夜生活模式</a:t>
+              <a:t>UBER</a:t>
             </a:r>
             <a:endParaRPr lang="zh-CN" altLang="en-US" dirty="0"/>
           </a:p>
@@ -5195,7 +5247,7 @@
     </p:spTree>
     <p:extLst>
       <p:ext uri="{BB962C8B-B14F-4D97-AF65-F5344CB8AC3E}">
-        <p14:creationId xmlns:p14="http://schemas.microsoft.com/office/powerpoint/2010/main" val="979797702"/>
+        <p14:creationId xmlns:p14="http://schemas.microsoft.com/office/powerpoint/2010/main" val="2882227733"/>
       </p:ext>
     </p:extLst>
   </p:cSld>
@@ -5239,7 +5291,7 @@
           <a:p>
             <a:r>
               <a:rPr lang="zh-CN" altLang="en-US" dirty="0" smtClean="0"/>
-              <a:t>什么样的地方适合做为目的地</a:t>
+              <a:t>客户定位</a:t>
             </a:r>
             <a:endParaRPr lang="zh-CN" altLang="en-US" dirty="0"/>
           </a:p>
@@ -5257,63 +5309,96 @@
         </p:nvSpPr>
         <p:spPr/>
         <p:txBody>
-          <a:bodyPr/>
-          <a:lstStyle/>
-          <a:p>
-            <a:r>
-              <a:rPr lang="zh-CN" altLang="en-US" dirty="0" smtClean="0"/>
-              <a:t>没有过度开发，</a:t>
-            </a:r>
+          <a:bodyPr>
+            <a:normAutofit fontScale="92500"/>
+          </a:bodyPr>
+          <a:lstStyle/>
+          <a:p>
             <a:r>
               <a:rPr lang="en-US" altLang="zh-CN" dirty="0" smtClean="0"/>
-              <a:t>4A</a:t>
-            </a:r>
-            <a:r>
-              <a:rPr lang="zh-CN" altLang="en-US" dirty="0" smtClean="0"/>
-              <a:t>、</a:t>
-            </a:r>
-            <a:r>
-              <a:rPr lang="en-US" altLang="zh-CN" dirty="0" smtClean="0"/>
-              <a:t>5A</a:t>
-            </a:r>
-            <a:r>
-              <a:rPr lang="zh-CN" altLang="en-US" dirty="0" smtClean="0"/>
-              <a:t>景点不多</a:t>
-            </a:r>
-            <a:endParaRPr lang="en-US" altLang="zh-CN" dirty="0" smtClean="0"/>
-          </a:p>
-          <a:p>
-            <a:r>
-              <a:rPr lang="zh-CN" altLang="en-US" dirty="0" smtClean="0"/>
-              <a:t>公共交通不是很方便</a:t>
-            </a:r>
-            <a:endParaRPr lang="en-US" altLang="zh-CN" dirty="0" smtClean="0"/>
-          </a:p>
-          <a:p>
-            <a:r>
-              <a:rPr lang="zh-CN" altLang="en-US" u="sng" dirty="0" smtClean="0"/>
-              <a:t>吃住行等周边设施不是特别完善</a:t>
-            </a:r>
-            <a:endParaRPr lang="en-US" altLang="zh-CN" u="sng" dirty="0" smtClean="0"/>
-          </a:p>
-          <a:p>
-            <a:r>
-              <a:rPr lang="zh-CN" altLang="en-US" dirty="0" smtClean="0"/>
-              <a:t>有一定的历史人文背景</a:t>
-            </a:r>
-            <a:endParaRPr lang="en-US" altLang="zh-CN" dirty="0" smtClean="0"/>
-          </a:p>
-          <a:p>
-            <a:r>
-              <a:rPr lang="zh-CN" altLang="en-US" dirty="0" smtClean="0"/>
-              <a:t>保存着一定的古老生活和饮食风俗</a:t>
-            </a:r>
-            <a:endParaRPr lang="en-US" altLang="zh-CN" dirty="0" smtClean="0"/>
-          </a:p>
-          <a:p>
-            <a:r>
-              <a:rPr lang="zh-CN" altLang="en-US" dirty="0" smtClean="0"/>
-              <a:t>自然风光优美，空气清新，食物新鲜</a:t>
+              <a:t>30-45</a:t>
+            </a:r>
+            <a:r>
+              <a:rPr lang="zh-CN" altLang="en-US" dirty="0" smtClean="0"/>
+              <a:t>岁之间的中产阶级</a:t>
+            </a:r>
+            <a:endParaRPr lang="en-US" altLang="zh-CN" dirty="0" smtClean="0"/>
+          </a:p>
+          <a:p>
+            <a:pPr lvl="1"/>
+            <a:r>
+              <a:rPr lang="zh-CN" altLang="en-US" dirty="0"/>
+              <a:t>上有</a:t>
+            </a:r>
+            <a:r>
+              <a:rPr lang="zh-CN" altLang="en-US" dirty="0" smtClean="0"/>
+              <a:t>老，下有小，旅游需求旺盛</a:t>
+            </a:r>
+            <a:endParaRPr lang="en-US" altLang="zh-CN" dirty="0" smtClean="0"/>
+          </a:p>
+          <a:p>
+            <a:pPr lvl="1"/>
+            <a:r>
+              <a:rPr lang="zh-CN" altLang="en-US" dirty="0"/>
+              <a:t>有</a:t>
+            </a:r>
+            <a:r>
+              <a:rPr lang="zh-CN" altLang="en-US" dirty="0" smtClean="0"/>
+              <a:t>一定的经济基础，不会陷入比价的牛角尖</a:t>
+            </a:r>
+            <a:endParaRPr lang="en-US" altLang="zh-CN" dirty="0" smtClean="0"/>
+          </a:p>
+          <a:p>
+            <a:pPr lvl="1"/>
+            <a:r>
+              <a:rPr lang="zh-CN" altLang="en-US" dirty="0" smtClean="0"/>
+              <a:t>愿意为旅游服务买单</a:t>
+            </a:r>
+            <a:endParaRPr lang="en-US" altLang="zh-CN" dirty="0" smtClean="0"/>
+          </a:p>
+          <a:p>
+            <a:r>
+              <a:rPr lang="zh-CN" altLang="en-US" dirty="0" smtClean="0"/>
+              <a:t>公司团建</a:t>
+            </a:r>
+            <a:endParaRPr lang="en-US" altLang="zh-CN" dirty="0" smtClean="0"/>
+          </a:p>
+          <a:p>
+            <a:pPr lvl="1"/>
+            <a:r>
+              <a:rPr lang="zh-CN" altLang="en-US" dirty="0" smtClean="0"/>
+              <a:t>不一样的团队建设</a:t>
+            </a:r>
+            <a:endParaRPr lang="en-US" altLang="zh-CN" dirty="0" smtClean="0"/>
+          </a:p>
+          <a:p>
+            <a:pPr lvl="1"/>
+            <a:r>
+              <a:rPr lang="zh-CN" altLang="en-US" dirty="0"/>
+              <a:t>定制</a:t>
+            </a:r>
+            <a:r>
+              <a:rPr lang="zh-CN" altLang="en-US" dirty="0" smtClean="0"/>
+              <a:t>化的内容</a:t>
+            </a:r>
+            <a:endParaRPr lang="en-US" altLang="zh-CN" dirty="0" smtClean="0"/>
+          </a:p>
+          <a:p>
+            <a:pPr lvl="1"/>
+            <a:r>
+              <a:rPr lang="zh-CN" altLang="en-US" dirty="0" smtClean="0"/>
+              <a:t>凝聚力强</a:t>
+            </a:r>
+            <a:endParaRPr lang="en-US" altLang="zh-CN" dirty="0" smtClean="0"/>
+          </a:p>
+          <a:p>
+            <a:r>
+              <a:rPr lang="zh-CN" altLang="en-US" dirty="0"/>
+              <a:t>上午</a:t>
+            </a:r>
+            <a:r>
+              <a:rPr lang="zh-CN" altLang="en-US" dirty="0" smtClean="0"/>
+              <a:t>景点、下午体验，晚上开启夜生活模式</a:t>
             </a:r>
             <a:endParaRPr lang="zh-CN" altLang="en-US" dirty="0"/>
           </a:p>
@@ -5322,7 +5407,7 @@
     </p:spTree>
     <p:extLst>
       <p:ext uri="{BB962C8B-B14F-4D97-AF65-F5344CB8AC3E}">
-        <p14:creationId xmlns:p14="http://schemas.microsoft.com/office/powerpoint/2010/main" val="807109977"/>
+        <p14:creationId xmlns:p14="http://schemas.microsoft.com/office/powerpoint/2010/main" val="979797702"/>
       </p:ext>
     </p:extLst>
   </p:cSld>
@@ -5366,7 +5451,7 @@
           <a:p>
             <a:r>
               <a:rPr lang="zh-CN" altLang="en-US" dirty="0" smtClean="0"/>
-              <a:t>达人和游客哪里来</a:t>
+              <a:t>什么样的地方适合做为目的地</a:t>
             </a:r>
             <a:endParaRPr lang="zh-CN" altLang="en-US" dirty="0"/>
           </a:p>
@@ -5389,40 +5474,67 @@
           <a:p>
             <a:r>
               <a:rPr lang="zh-CN" altLang="en-US" dirty="0" smtClean="0"/>
-              <a:t>加入爱玩人的群</a:t>
-            </a:r>
-            <a:endParaRPr lang="en-US" altLang="zh-CN" dirty="0" smtClean="0"/>
-          </a:p>
-          <a:p>
-            <a:r>
-              <a:rPr lang="zh-CN" altLang="en-US" dirty="0" smtClean="0"/>
-              <a:t>当地达人推介会</a:t>
-            </a:r>
-            <a:endParaRPr lang="en-US" altLang="zh-CN" dirty="0" smtClean="0"/>
-          </a:p>
-          <a:p>
-            <a:r>
-              <a:rPr lang="zh-CN" altLang="en-US" dirty="0"/>
-              <a:t>熟人</a:t>
-            </a:r>
-            <a:r>
-              <a:rPr lang="zh-CN" altLang="en-US" dirty="0" smtClean="0"/>
-              <a:t>介绍</a:t>
-            </a:r>
-            <a:endParaRPr lang="en-US" altLang="zh-CN" dirty="0" smtClean="0"/>
-          </a:p>
-          <a:p>
-            <a:r>
-              <a:rPr lang="zh-CN" altLang="en-US" dirty="0"/>
-              <a:t>达人培训</a:t>
-            </a:r>
+              <a:t>没有过度开发，</a:t>
+            </a:r>
+            <a:r>
+              <a:rPr lang="en-US" altLang="zh-CN" dirty="0" smtClean="0"/>
+              <a:t>4A</a:t>
+            </a:r>
+            <a:r>
+              <a:rPr lang="zh-CN" altLang="en-US" dirty="0" smtClean="0"/>
+              <a:t>、</a:t>
+            </a:r>
+            <a:r>
+              <a:rPr lang="en-US" altLang="zh-CN" dirty="0" smtClean="0"/>
+              <a:t>5A</a:t>
+            </a:r>
+            <a:r>
+              <a:rPr lang="zh-CN" altLang="en-US" dirty="0" smtClean="0"/>
+              <a:t>景点不多</a:t>
+            </a:r>
+            <a:endParaRPr lang="en-US" altLang="zh-CN" dirty="0" smtClean="0"/>
+          </a:p>
+          <a:p>
+            <a:r>
+              <a:rPr lang="zh-CN" altLang="en-US" dirty="0" smtClean="0"/>
+              <a:t>公共交通不是很方便</a:t>
+            </a:r>
+            <a:endParaRPr lang="en-US" altLang="zh-CN" dirty="0" smtClean="0"/>
+          </a:p>
+          <a:p>
+            <a:r>
+              <a:rPr lang="zh-CN" altLang="en-US" u="sng" dirty="0" smtClean="0"/>
+              <a:t>吃住行等周边设施不是特别完善</a:t>
+            </a:r>
+            <a:endParaRPr lang="en-US" altLang="zh-CN" u="sng" dirty="0" smtClean="0"/>
+          </a:p>
+          <a:p>
+            <a:r>
+              <a:rPr lang="zh-CN" altLang="en-US" dirty="0" smtClean="0"/>
+              <a:t>有一定的历史人文背景</a:t>
+            </a:r>
+            <a:endParaRPr lang="en-US" altLang="zh-CN" dirty="0" smtClean="0"/>
+          </a:p>
+          <a:p>
+            <a:r>
+              <a:rPr lang="zh-CN" altLang="en-US" dirty="0" smtClean="0"/>
+              <a:t>保存着一定的古老生活和饮食风俗</a:t>
+            </a:r>
+            <a:endParaRPr lang="en-US" altLang="zh-CN" dirty="0" smtClean="0"/>
+          </a:p>
+          <a:p>
+            <a:r>
+              <a:rPr lang="zh-CN" altLang="en-US" dirty="0" smtClean="0"/>
+              <a:t>自然风光优美，空气清新，食物新鲜</a:t>
+            </a:r>
+            <a:endParaRPr lang="zh-CN" altLang="en-US" dirty="0"/>
           </a:p>
         </p:txBody>
       </p:sp>
     </p:spTree>
     <p:extLst>
       <p:ext uri="{BB962C8B-B14F-4D97-AF65-F5344CB8AC3E}">
-        <p14:creationId xmlns:p14="http://schemas.microsoft.com/office/powerpoint/2010/main" val="3567964268"/>
+        <p14:creationId xmlns:p14="http://schemas.microsoft.com/office/powerpoint/2010/main" val="807109977"/>
       </p:ext>
     </p:extLst>
   </p:cSld>
@@ -5466,6 +5578,226 @@
           <a:p>
             <a:r>
               <a:rPr lang="zh-CN" altLang="en-US" dirty="0" smtClean="0"/>
+              <a:t>候选目的地</a:t>
+            </a:r>
+            <a:endParaRPr lang="zh-CN" altLang="en-US" dirty="0"/>
+          </a:p>
+        </p:txBody>
+      </p:sp>
+      <p:sp>
+        <p:nvSpPr>
+          <p:cNvPr id="3" name="内容占位符 2"/>
+          <p:cNvSpPr>
+            <a:spLocks noGrp="1"/>
+          </p:cNvSpPr>
+          <p:nvPr>
+            <p:ph idx="1"/>
+          </p:nvPr>
+        </p:nvSpPr>
+        <p:spPr/>
+        <p:txBody>
+          <a:bodyPr/>
+          <a:lstStyle/>
+          <a:p>
+            <a:r>
+              <a:rPr lang="zh-CN" altLang="en-US" dirty="0" smtClean="0"/>
+              <a:t>徽州：歙县</a:t>
+            </a:r>
+            <a:endParaRPr lang="en-US" altLang="zh-CN" dirty="0" smtClean="0"/>
+          </a:p>
+          <a:p>
+            <a:r>
+              <a:rPr lang="zh-CN" altLang="en-US" dirty="0"/>
+              <a:t>丽</a:t>
+            </a:r>
+            <a:r>
+              <a:rPr lang="zh-CN" altLang="en-US" dirty="0" smtClean="0"/>
+              <a:t>水：遂昌</a:t>
+            </a:r>
+            <a:endParaRPr lang="en-US" altLang="zh-CN" dirty="0" smtClean="0"/>
+          </a:p>
+          <a:p>
+            <a:r>
+              <a:rPr lang="zh-CN" altLang="en-US" dirty="0" smtClean="0"/>
+              <a:t>绍兴</a:t>
+            </a:r>
+            <a:endParaRPr lang="en-US" altLang="zh-CN" dirty="0" smtClean="0"/>
+          </a:p>
+          <a:p>
+            <a:r>
+              <a:rPr lang="zh-CN" altLang="en-US" dirty="0" smtClean="0"/>
+              <a:t>名古屋工业之旅</a:t>
+            </a:r>
+            <a:endParaRPr lang="en-US" altLang="zh-CN" dirty="0" smtClean="0"/>
+          </a:p>
+          <a:p>
+            <a:r>
+              <a:rPr lang="zh-CN" altLang="en-US" dirty="0" smtClean="0"/>
+              <a:t>雷州半岛：湛江</a:t>
+            </a:r>
+            <a:endParaRPr lang="zh-CN" altLang="en-US" dirty="0"/>
+          </a:p>
+        </p:txBody>
+      </p:sp>
+    </p:spTree>
+    <p:extLst>
+      <p:ext uri="{BB962C8B-B14F-4D97-AF65-F5344CB8AC3E}">
+        <p14:creationId xmlns:p14="http://schemas.microsoft.com/office/powerpoint/2010/main" val="3222797159"/>
+      </p:ext>
+    </p:extLst>
+  </p:cSld>
+  <p:clrMapOvr>
+    <a:masterClrMapping/>
+  </p:clrMapOvr>
+</p:sld>
+</file>
+
+<file path=ppt/slides/slide25.xml><?xml version="1.0" encoding="utf-8"?>
+<p:sld xmlns:a="http://schemas.openxmlformats.org/drawingml/2006/main" xmlns:r="http://schemas.openxmlformats.org/officeDocument/2006/relationships" xmlns:p="http://schemas.openxmlformats.org/presentationml/2006/main">
+  <p:cSld>
+    <p:spTree>
+      <p:nvGrpSpPr>
+        <p:cNvPr id="1" name=""/>
+        <p:cNvGrpSpPr/>
+        <p:nvPr/>
+      </p:nvGrpSpPr>
+      <p:grpSpPr>
+        <a:xfrm>
+          <a:off x="0" y="0"/>
+          <a:ext cx="0" cy="0"/>
+          <a:chOff x="0" y="0"/>
+          <a:chExt cx="0" cy="0"/>
+        </a:xfrm>
+      </p:grpSpPr>
+      <p:sp>
+        <p:nvSpPr>
+          <p:cNvPr id="2" name="标题 1"/>
+          <p:cNvSpPr>
+            <a:spLocks noGrp="1"/>
+          </p:cNvSpPr>
+          <p:nvPr>
+            <p:ph type="title"/>
+          </p:nvPr>
+        </p:nvSpPr>
+        <p:spPr/>
+        <p:txBody>
+          <a:bodyPr/>
+          <a:lstStyle/>
+          <a:p>
+            <a:r>
+              <a:rPr lang="zh-CN" altLang="en-US" dirty="0" smtClean="0"/>
+              <a:t>达人和游客哪里来</a:t>
+            </a:r>
+            <a:endParaRPr lang="zh-CN" altLang="en-US" dirty="0"/>
+          </a:p>
+        </p:txBody>
+      </p:sp>
+      <p:sp>
+        <p:nvSpPr>
+          <p:cNvPr id="3" name="内容占位符 2"/>
+          <p:cNvSpPr>
+            <a:spLocks noGrp="1"/>
+          </p:cNvSpPr>
+          <p:nvPr>
+            <p:ph idx="1"/>
+          </p:nvPr>
+        </p:nvSpPr>
+        <p:spPr/>
+        <p:txBody>
+          <a:bodyPr/>
+          <a:lstStyle/>
+          <a:p>
+            <a:r>
+              <a:rPr lang="zh-CN" altLang="en-US" dirty="0" smtClean="0"/>
+              <a:t>加入爱玩人的群</a:t>
+            </a:r>
+            <a:endParaRPr lang="en-US" altLang="zh-CN" dirty="0" smtClean="0"/>
+          </a:p>
+          <a:p>
+            <a:r>
+              <a:rPr lang="zh-CN" altLang="en-US" dirty="0" smtClean="0"/>
+              <a:t>当地达人推介会</a:t>
+            </a:r>
+            <a:endParaRPr lang="en-US" altLang="zh-CN" dirty="0" smtClean="0"/>
+          </a:p>
+          <a:p>
+            <a:r>
+              <a:rPr lang="zh-CN" altLang="en-US" dirty="0"/>
+              <a:t>熟人</a:t>
+            </a:r>
+            <a:r>
+              <a:rPr lang="zh-CN" altLang="en-US" dirty="0" smtClean="0"/>
+              <a:t>介绍</a:t>
+            </a:r>
+            <a:endParaRPr lang="en-US" altLang="zh-CN" dirty="0" smtClean="0"/>
+          </a:p>
+          <a:p>
+            <a:r>
+              <a:rPr lang="zh-CN" altLang="en-US" dirty="0"/>
+              <a:t>达人</a:t>
+            </a:r>
+            <a:r>
+              <a:rPr lang="zh-CN" altLang="en-US" dirty="0" smtClean="0"/>
+              <a:t>培训</a:t>
+            </a:r>
+            <a:endParaRPr lang="en-US" altLang="zh-CN" dirty="0" smtClean="0"/>
+          </a:p>
+          <a:p>
+            <a:r>
+              <a:rPr lang="zh-CN" altLang="en-US" dirty="0" smtClean="0"/>
+              <a:t>一些高端的会员制会所</a:t>
+            </a:r>
+            <a:endParaRPr lang="zh-CN" altLang="en-US" dirty="0"/>
+          </a:p>
+        </p:txBody>
+      </p:sp>
+    </p:spTree>
+    <p:extLst>
+      <p:ext uri="{BB962C8B-B14F-4D97-AF65-F5344CB8AC3E}">
+        <p14:creationId xmlns:p14="http://schemas.microsoft.com/office/powerpoint/2010/main" val="3567964268"/>
+      </p:ext>
+    </p:extLst>
+  </p:cSld>
+  <p:clrMapOvr>
+    <a:masterClrMapping/>
+  </p:clrMapOvr>
+</p:sld>
+</file>
+
+<file path=ppt/slides/slide26.xml><?xml version="1.0" encoding="utf-8"?>
+<p:sld xmlns:a="http://schemas.openxmlformats.org/drawingml/2006/main" xmlns:r="http://schemas.openxmlformats.org/officeDocument/2006/relationships" xmlns:p="http://schemas.openxmlformats.org/presentationml/2006/main">
+  <p:cSld>
+    <p:spTree>
+      <p:nvGrpSpPr>
+        <p:cNvPr id="1" name=""/>
+        <p:cNvGrpSpPr/>
+        <p:nvPr/>
+      </p:nvGrpSpPr>
+      <p:grpSpPr>
+        <a:xfrm>
+          <a:off x="0" y="0"/>
+          <a:ext cx="0" cy="0"/>
+          <a:chOff x="0" y="0"/>
+          <a:chExt cx="0" cy="0"/>
+        </a:xfrm>
+      </p:grpSpPr>
+      <p:sp>
+        <p:nvSpPr>
+          <p:cNvPr id="2" name="标题 1"/>
+          <p:cNvSpPr>
+            <a:spLocks noGrp="1"/>
+          </p:cNvSpPr>
+          <p:nvPr>
+            <p:ph type="title"/>
+          </p:nvPr>
+        </p:nvSpPr>
+        <p:spPr/>
+        <p:txBody>
+          <a:bodyPr/>
+          <a:lstStyle/>
+          <a:p>
+            <a:r>
+              <a:rPr lang="zh-CN" altLang="en-US" dirty="0" smtClean="0"/>
               <a:t>市场合作</a:t>
             </a:r>
             <a:endParaRPr lang="zh-CN" altLang="en-US" dirty="0"/>
@@ -5484,12 +5816,22 @@
         </p:nvSpPr>
         <p:spPr/>
         <p:txBody>
-          <a:bodyPr/>
+          <a:bodyPr>
+            <a:normAutofit lnSpcReduction="10000"/>
+          </a:bodyPr>
           <a:lstStyle/>
           <a:p>
             <a:r>
               <a:rPr lang="zh-CN" altLang="en-US" dirty="0" smtClean="0"/>
               <a:t>新华网旅游社区</a:t>
+            </a:r>
+            <a:r>
+              <a:rPr lang="en-US" altLang="zh-CN" dirty="0" smtClean="0"/>
+              <a:t>-》</a:t>
+            </a:r>
+            <a:r>
+              <a:rPr lang="zh-CN" altLang="en-US" dirty="0" smtClean="0"/>
+              <a:t>海南：李伟</a:t>
             </a:r>
             <a:endParaRPr lang="en-US" altLang="zh-CN" dirty="0" smtClean="0"/>
           </a:p>
@@ -5507,6 +5849,32 @@
           <a:p>
             <a:r>
               <a:rPr lang="zh-CN" altLang="en-US" dirty="0" smtClean="0"/>
+              <a:t>东航巨鹿</a:t>
+            </a:r>
+            <a:r>
+              <a:rPr lang="zh-CN" altLang="en-US" dirty="0" smtClean="0"/>
+              <a:t>路：谢总</a:t>
+            </a:r>
+            <a:endParaRPr lang="en-US" altLang="zh-CN" dirty="0" smtClean="0"/>
+          </a:p>
+          <a:p>
+            <a:r>
+              <a:rPr lang="zh-CN" altLang="en-US" dirty="0"/>
+              <a:t>佰</a:t>
+            </a:r>
+            <a:r>
+              <a:rPr lang="zh-CN" altLang="en-US" dirty="0" smtClean="0"/>
+              <a:t>威</a:t>
+            </a:r>
+            <a:r>
+              <a:rPr lang="zh-CN" altLang="en-US" dirty="0" smtClean="0"/>
+              <a:t>旅行社：唐总</a:t>
+            </a:r>
+            <a:endParaRPr lang="en-US" altLang="zh-CN" dirty="0" smtClean="0"/>
+          </a:p>
+          <a:p>
+            <a:r>
+              <a:rPr lang="zh-CN" altLang="en-US" dirty="0" smtClean="0"/>
               <a:t>小</a:t>
             </a:r>
             <a:r>
@@ -5515,7 +5883,7 @@
             </a:r>
             <a:r>
               <a:rPr lang="zh-CN" altLang="en-US" dirty="0" smtClean="0"/>
-              <a:t>机器人</a:t>
+              <a:t>机器人：王</a:t>
             </a:r>
             <a:endParaRPr lang="en-US" altLang="zh-CN" dirty="0" smtClean="0"/>
           </a:p>
@@ -5527,6 +5895,36 @@
             <a:r>
               <a:rPr lang="zh-CN" altLang="en-US" dirty="0" smtClean="0"/>
               <a:t>信打赏</a:t>
+            </a:r>
+            <a:endParaRPr lang="en-US" altLang="zh-CN" dirty="0" smtClean="0"/>
+          </a:p>
+          <a:p>
+            <a:r>
+              <a:rPr lang="zh-CN" altLang="en-US" dirty="0"/>
+              <a:t>同</a:t>
+            </a:r>
+            <a:r>
+              <a:rPr lang="zh-CN" altLang="en-US" dirty="0" smtClean="0"/>
+              <a:t>程</a:t>
+            </a:r>
+            <a:r>
+              <a:rPr lang="en-US" altLang="zh-CN" dirty="0" smtClean="0"/>
+              <a:t>-》</a:t>
+            </a:r>
+            <a:r>
+              <a:rPr lang="zh-CN" altLang="en-US" dirty="0" smtClean="0"/>
+              <a:t>高端会所（张江</a:t>
+            </a:r>
+            <a:r>
+              <a:rPr lang="zh-CN" altLang="en-US" dirty="0" smtClean="0"/>
+              <a:t>）：王</a:t>
+            </a:r>
+            <a:endParaRPr lang="en-US" altLang="zh-CN" dirty="0" smtClean="0"/>
+          </a:p>
+          <a:p>
+            <a:r>
+              <a:rPr lang="zh-CN" altLang="en-US" dirty="0"/>
+              <a:t>野友网</a:t>
             </a:r>
             <a:endParaRPr lang="zh-CN" altLang="en-US" dirty="0"/>
           </a:p>
@@ -5536,6 +5934,173 @@
     <p:extLst>
       <p:ext uri="{BB962C8B-B14F-4D97-AF65-F5344CB8AC3E}">
         <p14:creationId xmlns:p14="http://schemas.microsoft.com/office/powerpoint/2010/main" val="2848646836"/>
+      </p:ext>
+    </p:extLst>
+  </p:cSld>
+  <p:clrMapOvr>
+    <a:masterClrMapping/>
+  </p:clrMapOvr>
+</p:sld>
+</file>
+
+<file path=ppt/slides/slide27.xml><?xml version="1.0" encoding="utf-8"?>
+<p:sld xmlns:a="http://schemas.openxmlformats.org/drawingml/2006/main" xmlns:r="http://schemas.openxmlformats.org/officeDocument/2006/relationships" xmlns:p="http://schemas.openxmlformats.org/presentationml/2006/main">
+  <p:cSld>
+    <p:spTree>
+      <p:nvGrpSpPr>
+        <p:cNvPr id="1" name=""/>
+        <p:cNvGrpSpPr/>
+        <p:nvPr/>
+      </p:nvGrpSpPr>
+      <p:grpSpPr>
+        <a:xfrm>
+          <a:off x="0" y="0"/>
+          <a:ext cx="0" cy="0"/>
+          <a:chOff x="0" y="0"/>
+          <a:chExt cx="0" cy="0"/>
+        </a:xfrm>
+      </p:grpSpPr>
+      <p:sp>
+        <p:nvSpPr>
+          <p:cNvPr id="2" name="标题 1"/>
+          <p:cNvSpPr>
+            <a:spLocks noGrp="1"/>
+          </p:cNvSpPr>
+          <p:nvPr>
+            <p:ph type="title"/>
+          </p:nvPr>
+        </p:nvSpPr>
+        <p:spPr/>
+        <p:txBody>
+          <a:bodyPr/>
+          <a:lstStyle/>
+          <a:p>
+            <a:r>
+              <a:rPr lang="zh-CN" altLang="en-US" dirty="0" smtClean="0"/>
+              <a:t>问题</a:t>
+            </a:r>
+            <a:endParaRPr lang="zh-CN" altLang="en-US" dirty="0"/>
+          </a:p>
+        </p:txBody>
+      </p:sp>
+      <p:sp>
+        <p:nvSpPr>
+          <p:cNvPr id="3" name="内容占位符 2"/>
+          <p:cNvSpPr>
+            <a:spLocks noGrp="1"/>
+          </p:cNvSpPr>
+          <p:nvPr>
+            <p:ph idx="1"/>
+          </p:nvPr>
+        </p:nvSpPr>
+        <p:spPr/>
+        <p:txBody>
+          <a:bodyPr>
+            <a:normAutofit fontScale="85000" lnSpcReduction="10000"/>
+          </a:bodyPr>
+          <a:lstStyle/>
+          <a:p>
+            <a:r>
+              <a:rPr lang="zh-CN" altLang="en-US" dirty="0" smtClean="0"/>
+              <a:t>百家讲坛一样的视频，文化</a:t>
+            </a:r>
+            <a:r>
+              <a:rPr lang="en-US" altLang="zh-CN" dirty="0" smtClean="0"/>
+              <a:t>+</a:t>
+            </a:r>
+            <a:r>
+              <a:rPr lang="zh-CN" altLang="en-US" dirty="0" smtClean="0"/>
+              <a:t>旅游</a:t>
+            </a:r>
+            <a:r>
+              <a:rPr lang="en-US" altLang="zh-CN" dirty="0" smtClean="0"/>
+              <a:t>+</a:t>
+            </a:r>
+            <a:r>
+              <a:rPr lang="zh-CN" altLang="en-US" dirty="0" smtClean="0"/>
+              <a:t>景点</a:t>
+            </a:r>
+            <a:r>
+              <a:rPr lang="en-US" altLang="zh-CN" dirty="0" smtClean="0"/>
+              <a:t>+</a:t>
+            </a:r>
+            <a:r>
+              <a:rPr lang="zh-CN" altLang="en-US" dirty="0" smtClean="0"/>
+              <a:t>背景故事</a:t>
+            </a:r>
+            <a:endParaRPr lang="en-US" altLang="zh-CN" dirty="0" smtClean="0"/>
+          </a:p>
+          <a:p>
+            <a:r>
+              <a:rPr lang="zh-CN" altLang="en-US" dirty="0"/>
+              <a:t>有情怀</a:t>
+            </a:r>
+            <a:r>
+              <a:rPr lang="zh-CN" altLang="en-US" dirty="0" smtClean="0"/>
+              <a:t>的，迷茫，小富即安</a:t>
+            </a:r>
+            <a:endParaRPr lang="en-US" altLang="zh-CN" dirty="0" smtClean="0"/>
+          </a:p>
+          <a:p>
+            <a:r>
+              <a:rPr lang="zh-CN" altLang="en-US" dirty="0" smtClean="0"/>
+              <a:t>沙龙、兄弟会也想变现，或者通过某种方式更实际一些，更紧密一些</a:t>
+            </a:r>
+            <a:endParaRPr lang="en-US" altLang="zh-CN" dirty="0" smtClean="0"/>
+          </a:p>
+          <a:p>
+            <a:r>
+              <a:rPr lang="zh-CN" altLang="en-US" dirty="0" smtClean="0"/>
+              <a:t>如何成为目的地的入口</a:t>
+            </a:r>
+            <a:endParaRPr lang="en-US" altLang="zh-CN" dirty="0" smtClean="0"/>
+          </a:p>
+          <a:p>
+            <a:pPr lvl="1"/>
+            <a:r>
+              <a:rPr lang="zh-CN" altLang="en-US" dirty="0" smtClean="0"/>
+              <a:t>活动</a:t>
+            </a:r>
+            <a:endParaRPr lang="en-US" altLang="zh-CN" dirty="0" smtClean="0"/>
+          </a:p>
+          <a:p>
+            <a:pPr lvl="1"/>
+            <a:r>
+              <a:rPr lang="zh-CN" altLang="en-US" dirty="0" smtClean="0"/>
+              <a:t>达人</a:t>
+            </a:r>
+            <a:endParaRPr lang="en-US" altLang="zh-CN" dirty="0" smtClean="0"/>
+          </a:p>
+          <a:p>
+            <a:pPr lvl="1"/>
+            <a:r>
+              <a:rPr lang="zh-CN" altLang="en-US" dirty="0" smtClean="0"/>
+              <a:t>目的地资源</a:t>
+            </a:r>
+            <a:endParaRPr lang="en-US" altLang="zh-CN" dirty="0" smtClean="0"/>
+          </a:p>
+          <a:p>
+            <a:pPr lvl="1"/>
+            <a:r>
+              <a:rPr lang="zh-CN" altLang="en-US" dirty="0" smtClean="0"/>
+              <a:t>旅游资讯</a:t>
+            </a:r>
+            <a:endParaRPr lang="en-US" altLang="zh-CN" dirty="0" smtClean="0"/>
+          </a:p>
+          <a:p>
+            <a:pPr lvl="1"/>
+            <a:r>
+              <a:rPr lang="zh-CN" altLang="en-US" dirty="0"/>
+              <a:t>推荐行程</a:t>
+            </a:r>
+            <a:endParaRPr lang="en-US" altLang="zh-CN" dirty="0" smtClean="0"/>
+          </a:p>
+        </p:txBody>
+      </p:sp>
+    </p:spTree>
+    <p:extLst>
+      <p:ext uri="{BB962C8B-B14F-4D97-AF65-F5344CB8AC3E}">
+        <p14:creationId xmlns:p14="http://schemas.microsoft.com/office/powerpoint/2010/main" val="3336839650"/>
       </p:ext>
     </p:extLst>
   </p:cSld>
@@ -5662,6 +6227,13 @@
   <p:clrMapOvr>
     <a:masterClrMapping/>
   </p:clrMapOvr>
+  <p:timing>
+    <p:tnLst>
+      <p:par>
+        <p:cTn id="1" dur="indefinite" restart="never" nodeType="tmRoot"/>
+      </p:par>
+    </p:tnLst>
+  </p:timing>
 </p:sld>
 </file>
 
@@ -5834,6 +6406,13 @@
   <p:clrMapOvr>
     <a:masterClrMapping/>
   </p:clrMapOvr>
+  <p:timing>
+    <p:tnLst>
+      <p:par>
+        <p:cTn id="1" dur="indefinite" restart="never" nodeType="tmRoot"/>
+      </p:par>
+    </p:tnLst>
+  </p:timing>
 </p:sld>
 </file>
 
@@ -6030,15 +6609,7 @@
             </a:r>
             <a:r>
               <a:rPr lang="zh-CN" altLang="en-US" dirty="0" smtClean="0"/>
-              <a:t>领域</a:t>
-            </a:r>
-            <a:r>
-              <a:rPr lang="zh-CN" altLang="en-US" dirty="0" smtClean="0"/>
-              <a:t>细分垂直市场</a:t>
-            </a:r>
-            <a:r>
-              <a:rPr lang="zh-CN" altLang="en-US" dirty="0" smtClean="0"/>
-              <a:t>出现，机票、酒店、租车、景点、餐饮和游记，用户看了游记，自己制定形成，预订各类服务成为时尚</a:t>
+              <a:t>领域细分垂直市场出现，机票、酒店、租车、景点、餐饮和游记，用户看了游记，自己制定形成，预订各类服务成为时尚</a:t>
             </a:r>
             <a:endParaRPr lang="zh-CN" altLang="en-US" dirty="0"/>
           </a:p>
@@ -6091,11 +6662,7 @@
           <a:p>
             <a:r>
               <a:rPr lang="zh-CN" altLang="en-US" dirty="0" smtClean="0"/>
-              <a:t>近期</a:t>
-            </a:r>
-            <a:r>
-              <a:rPr lang="zh-CN" altLang="en-US" dirty="0" smtClean="0"/>
-              <a:t>的新趋势</a:t>
+              <a:t>近期的新趋势</a:t>
             </a:r>
             <a:endParaRPr lang="zh-CN" altLang="en-US" dirty="0"/>
           </a:p>
@@ -6113,7 +6680,9 @@
         </p:nvSpPr>
         <p:spPr/>
         <p:txBody>
-          <a:bodyPr/>
+          <a:bodyPr>
+            <a:normAutofit lnSpcReduction="10000"/>
+          </a:bodyPr>
           <a:lstStyle/>
           <a:p>
             <a:r>
@@ -6126,7 +6695,15 @@
             </a:r>
             <a:r>
               <a:rPr lang="zh-CN" altLang="en-US" dirty="0" smtClean="0"/>
-              <a:t>游记等细分市场，也出现了一些新型的</a:t>
+              <a:t>游记等</a:t>
+            </a:r>
+            <a:r>
+              <a:rPr lang="zh-CN" altLang="en-US" dirty="0"/>
+              <a:t>细分</a:t>
+            </a:r>
+            <a:r>
+              <a:rPr lang="zh-CN" altLang="en-US" dirty="0" smtClean="0"/>
+              <a:t>市场的碎片化，也出现了一些新型的</a:t>
             </a:r>
             <a:r>
               <a:rPr lang="en-US" altLang="zh-CN" dirty="0" smtClean="0"/>
@@ -6172,7 +6749,7 @@
             </a:r>
             <a:r>
               <a:rPr lang="zh-CN" altLang="en-US" dirty="0" smtClean="0"/>
-              <a:t>，穷游行程助手，游谱（行程的制定还是取决于游客的功课深度，否则还是两眼一抹黑）</a:t>
+              <a:t>，穷游行程助手，游谱（行程的制定还是取决于游客的功课深度，否则还是两眼一抹黑），取决于用户专业度</a:t>
             </a:r>
             <a:endParaRPr lang="zh-CN" altLang="en-US" dirty="0"/>
           </a:p>
@@ -6244,29 +6821,20 @@
         <p:spPr/>
         <p:txBody>
           <a:bodyPr>
-            <a:normAutofit fontScale="77500" lnSpcReduction="20000"/>
+            <a:normAutofit fontScale="55000" lnSpcReduction="20000"/>
           </a:bodyPr>
           <a:lstStyle/>
           <a:p>
-            <a:r>
-              <a:rPr lang="zh-CN" altLang="en-US" dirty="0" smtClean="0"/>
-              <a:t>服务提供商（旅游公司、</a:t>
-            </a:r>
             <a:r>
               <a:rPr lang="en-US" altLang="zh-CN" dirty="0" smtClean="0"/>
               <a:t>OTA</a:t>
             </a:r>
-            <a:r>
-              <a:rPr lang="zh-CN" altLang="en-US" dirty="0" smtClean="0"/>
-              <a:t>）</a:t>
-            </a:r>
-            <a:endParaRPr lang="en-US" altLang="zh-CN" dirty="0" smtClean="0"/>
-          </a:p>
-          <a:p>
-            <a:pPr lvl="1"/>
-            <a:r>
-              <a:rPr lang="zh-CN" altLang="en-US" dirty="0" smtClean="0"/>
-              <a:t>陷入价格竞争的泥沼</a:t>
+          </a:p>
+          <a:p>
+            <a:pPr lvl="1"/>
+            <a:r>
+              <a:rPr lang="zh-CN" altLang="en-US" dirty="0" smtClean="0"/>
+              <a:t>陷入价格竞争的泥沼，利润不高，容易形成葱姜团</a:t>
             </a:r>
             <a:endParaRPr lang="en-US" altLang="zh-CN" dirty="0" smtClean="0"/>
           </a:p>
@@ -6285,12 +6853,55 @@
           <a:p>
             <a:pPr lvl="1"/>
             <a:r>
+              <a:rPr lang="zh-CN" altLang="en-US" dirty="0" smtClean="0"/>
+              <a:t>吃的团餐，住的也不满意</a:t>
+            </a:r>
+            <a:endParaRPr lang="en-US" altLang="zh-CN" dirty="0" smtClean="0"/>
+          </a:p>
+          <a:p>
+            <a:r>
               <a:rPr lang="zh-CN" altLang="en-US" dirty="0"/>
-              <a:t>住</a:t>
-            </a:r>
-            <a:r>
-              <a:rPr lang="zh-CN" altLang="en-US" dirty="0" smtClean="0"/>
-              <a:t>的、吃的都不好</a:t>
+              <a:t>地</a:t>
+            </a:r>
+            <a:r>
+              <a:rPr lang="zh-CN" altLang="en-US" dirty="0" smtClean="0"/>
+              <a:t>陪公司</a:t>
+            </a:r>
+            <a:endParaRPr lang="en-US" altLang="zh-CN" dirty="0" smtClean="0"/>
+          </a:p>
+          <a:p>
+            <a:pPr lvl="1"/>
+            <a:r>
+              <a:rPr lang="zh-CN" altLang="en-US" dirty="0" smtClean="0"/>
+              <a:t>承包</a:t>
+            </a:r>
+            <a:r>
+              <a:rPr lang="en-US" altLang="zh-CN" dirty="0" smtClean="0"/>
+              <a:t>OTA</a:t>
+            </a:r>
+            <a:r>
+              <a:rPr lang="zh-CN" altLang="en-US" dirty="0" smtClean="0"/>
+              <a:t>的目的地，货款压力很大</a:t>
+            </a:r>
+            <a:endParaRPr lang="en-US" altLang="zh-CN" dirty="0" smtClean="0"/>
+          </a:p>
+          <a:p>
+            <a:pPr lvl="1"/>
+            <a:r>
+              <a:rPr lang="zh-CN" altLang="en-US" dirty="0"/>
+              <a:t>优质</a:t>
+            </a:r>
+            <a:r>
+              <a:rPr lang="zh-CN" altLang="en-US" dirty="0" smtClean="0"/>
+              <a:t>客户很少，</a:t>
+            </a:r>
+            <a:r>
+              <a:rPr lang="en-US" altLang="zh-CN" dirty="0" smtClean="0"/>
+              <a:t>ARPU</a:t>
+            </a:r>
+            <a:r>
+              <a:rPr lang="zh-CN" altLang="en-US" dirty="0" smtClean="0"/>
+              <a:t>值不高</a:t>
             </a:r>
             <a:endParaRPr lang="en-US" altLang="zh-CN" dirty="0" smtClean="0"/>
           </a:p>
@@ -6305,15 +6916,15 @@
             <a:pPr lvl="1"/>
             <a:r>
               <a:rPr lang="zh-CN" altLang="en-US" dirty="0" smtClean="0"/>
-              <a:t>游客潜意识觉得导游斩客，主要靠提成，尤其是低价团</a:t>
-            </a:r>
-            <a:endParaRPr lang="en-US" altLang="zh-CN" dirty="0" smtClean="0"/>
-          </a:p>
-          <a:p>
-            <a:pPr lvl="1"/>
-            <a:r>
-              <a:rPr lang="zh-CN" altLang="en-US" dirty="0" smtClean="0"/>
-              <a:t>老师被导游赶着跑</a:t>
+              <a:t>在游客的对立面</a:t>
+            </a:r>
+            <a:endParaRPr lang="en-US" altLang="zh-CN" dirty="0" smtClean="0"/>
+          </a:p>
+          <a:p>
+            <a:pPr lvl="1"/>
+            <a:r>
+              <a:rPr lang="zh-CN" altLang="en-US" dirty="0" smtClean="0"/>
+              <a:t>游客怎么还不买东西</a:t>
             </a:r>
             <a:endParaRPr lang="en-US" altLang="zh-CN" dirty="0" smtClean="0"/>
           </a:p>
@@ -6327,8 +6938,36 @@
           <a:p>
             <a:pPr lvl="1"/>
             <a:r>
+              <a:rPr lang="zh-CN" altLang="en-US" dirty="0" smtClean="0"/>
+              <a:t>在导游的对立面</a:t>
+            </a:r>
+            <a:endParaRPr lang="en-US" altLang="zh-CN" dirty="0" smtClean="0"/>
+          </a:p>
+          <a:p>
+            <a:pPr lvl="1"/>
+            <a:r>
+              <a:rPr lang="zh-CN" altLang="en-US" dirty="0" smtClean="0"/>
+              <a:t>游客</a:t>
+            </a:r>
+            <a:r>
               <a:rPr lang="zh-CN" altLang="en-US" dirty="0"/>
-              <a:t>跟团</a:t>
+              <a:t>潜意识觉得导游斩客，主要靠提成，尤其是低价</a:t>
+            </a:r>
+            <a:r>
+              <a:rPr lang="zh-CN" altLang="en-US" dirty="0" smtClean="0"/>
+              <a:t>团</a:t>
+            </a:r>
+            <a:endParaRPr lang="en-US" altLang="zh-CN" dirty="0" smtClean="0"/>
+          </a:p>
+          <a:p>
+            <a:pPr lvl="1"/>
+            <a:r>
+              <a:rPr lang="zh-CN" altLang="en-US" dirty="0" smtClean="0"/>
+              <a:t>跟</a:t>
+            </a:r>
+            <a:r>
+              <a:rPr lang="zh-CN" altLang="en-US" dirty="0"/>
+              <a:t>团</a:t>
             </a:r>
             <a:r>
               <a:rPr lang="zh-CN" altLang="en-US" dirty="0" smtClean="0"/>
@@ -6401,7 +7040,7 @@
           <a:p>
             <a:r>
               <a:rPr lang="zh-CN" altLang="en-US" dirty="0" smtClean="0"/>
-              <a:t>自助游客的困惑</a:t>
+              <a:t>产业链各端都不满意</a:t>
             </a:r>
             <a:endParaRPr lang="zh-CN" altLang="en-US" dirty="0"/>
           </a:p>
@@ -6420,77 +7059,51 @@
         <p:spPr/>
         <p:txBody>
           <a:bodyPr>
-            <a:normAutofit fontScale="92500"/>
+            <a:normAutofit fontScale="85000" lnSpcReduction="20000"/>
           </a:bodyPr>
           <a:lstStyle/>
           <a:p>
             <a:r>
+              <a:rPr lang="en-US" altLang="zh-CN" dirty="0" smtClean="0"/>
+              <a:t>OTA</a:t>
+            </a:r>
+            <a:r>
+              <a:rPr lang="zh-CN" altLang="en-US" dirty="0" smtClean="0"/>
+              <a:t>不想做与人相关的服务，例如只想做单项的服务，有线路也是丢给地陪公司，投诉量太</a:t>
+            </a:r>
+            <a:r>
               <a:rPr lang="zh-CN" altLang="en-US" dirty="0"/>
-              <a:t>到了目的地，不停的看地图，找地方，询问和沟通花了太多的时间</a:t>
-            </a:r>
-            <a:endParaRPr lang="en-US" altLang="zh-CN" dirty="0"/>
-          </a:p>
-          <a:p>
-            <a:pPr lvl="2"/>
-            <a:r>
-              <a:rPr lang="zh-CN" altLang="en-US" dirty="0" smtClean="0"/>
-              <a:t>附近有什么好玩的</a:t>
-            </a:r>
-            <a:endParaRPr lang="en-US" altLang="zh-CN" dirty="0" smtClean="0"/>
-          </a:p>
-          <a:p>
-            <a:pPr lvl="2"/>
-            <a:r>
-              <a:rPr lang="zh-CN" altLang="en-US" dirty="0" smtClean="0"/>
-              <a:t>房间</a:t>
-            </a:r>
+              <a:t>大，资源资源碎片</a:t>
+            </a:r>
+            <a:r>
+              <a:rPr lang="zh-CN" altLang="en-US" dirty="0" smtClean="0"/>
+              <a:t>化（携程），另外希望提供面对面的本地旅游客户经理（同程）</a:t>
+            </a:r>
+            <a:endParaRPr lang="en-US" altLang="zh-CN" dirty="0" smtClean="0"/>
+          </a:p>
+          <a:p>
             <a:r>
               <a:rPr lang="zh-CN" altLang="en-US" dirty="0"/>
-              <a:t>和网上展示的也不太一样</a:t>
-            </a:r>
-            <a:endParaRPr lang="en-US" altLang="zh-CN" dirty="0"/>
-          </a:p>
-          <a:p>
-            <a:pPr lvl="2"/>
-            <a:r>
-              <a:rPr lang="zh-CN" altLang="en-US" dirty="0"/>
-              <a:t>每天不知道吃什么，头疼</a:t>
-            </a:r>
-            <a:endParaRPr lang="en-US" altLang="zh-CN" dirty="0"/>
-          </a:p>
-          <a:p>
-            <a:pPr lvl="2"/>
-            <a:r>
-              <a:rPr lang="zh-CN" altLang="en-US" dirty="0" smtClean="0"/>
-              <a:t>怎么从机场</a:t>
-            </a:r>
-            <a:r>
-              <a:rPr lang="en-US" altLang="zh-CN" dirty="0" smtClean="0"/>
-              <a:t>/</a:t>
-            </a:r>
-            <a:r>
-              <a:rPr lang="zh-CN" altLang="en-US" dirty="0" smtClean="0"/>
-              <a:t>火车站到宾馆</a:t>
-            </a:r>
-            <a:endParaRPr lang="en-US" altLang="zh-CN" dirty="0" smtClean="0"/>
-          </a:p>
-          <a:p>
-            <a:pPr lvl="1"/>
-            <a:r>
-              <a:rPr lang="zh-CN" altLang="en-US" dirty="0" smtClean="0"/>
-              <a:t>能不能有人给我全程讲讲当地的文化、传说故事，什么东西好吃</a:t>
-            </a:r>
-            <a:endParaRPr lang="en-US" altLang="zh-CN" dirty="0" smtClean="0"/>
-          </a:p>
-          <a:p>
-            <a:pPr lvl="1"/>
-            <a:r>
-              <a:rPr lang="zh-CN" altLang="en-US" dirty="0" smtClean="0"/>
-              <a:t>交通是个大问题，坐公共交通有时间限制，不能尽情的玩，自己开车又太累，开了怕玩不动了</a:t>
-            </a:r>
-            <a:endParaRPr lang="zh-CN" altLang="en-US" dirty="0"/>
-          </a:p>
-          <a:p>
+              <a:t>地陪</a:t>
+            </a:r>
+            <a:r>
+              <a:rPr lang="zh-CN" altLang="en-US" dirty="0" smtClean="0"/>
+              <a:t>公司资金链太长，也不想做低附加值的葱姜团，开始注重用户服务，转向朋友圈和高端用户</a:t>
+            </a:r>
+            <a:endParaRPr lang="en-US" altLang="zh-CN" dirty="0" smtClean="0"/>
+          </a:p>
+          <a:p>
+            <a:r>
+              <a:rPr lang="zh-CN" altLang="en-US" dirty="0" smtClean="0"/>
+              <a:t>导游只带用户去能挣钱的景点，而不是当地最好玩的地方，好玩的地方不一定挣钱，提成也只有很小的一部分归导游，最好自己当自己的老板</a:t>
+            </a:r>
+            <a:endParaRPr lang="en-US" altLang="zh-CN" dirty="0" smtClean="0"/>
+          </a:p>
+          <a:p>
+            <a:r>
+              <a:rPr lang="zh-CN" altLang="en-US" dirty="0" smtClean="0"/>
+              <a:t>游客觉得导游总是带他买东西，互相潜意识站在了对立面，还是希望玩不一样的，随心所欲的玩，并有人提供一站式的服务</a:t>
+            </a:r>
             <a:endParaRPr lang="zh-CN" altLang="en-US" dirty="0"/>
           </a:p>
         </p:txBody>
@@ -6498,7 +7111,7 @@
     </p:spTree>
     <p:extLst>
       <p:ext uri="{BB962C8B-B14F-4D97-AF65-F5344CB8AC3E}">
-        <p14:creationId xmlns:p14="http://schemas.microsoft.com/office/powerpoint/2010/main" val="422544032"/>
+        <p14:creationId xmlns:p14="http://schemas.microsoft.com/office/powerpoint/2010/main" val="3707058183"/>
       </p:ext>
     </p:extLst>
   </p:cSld>

</xml_diff>